<commit_message>
BMBI Product Overview Presentation has been modified.
BMBI Product Overview Presentation has been modified.
</commit_message>
<xml_diff>
--- a/presentations/BMBI-ProductOverview.pptx
+++ b/presentations/BMBI-ProductOverview.pptx
@@ -5,7 +5,7 @@
     <p:sldMasterId id="2147483648" r:id="rId1"/>
   </p:sldMasterIdLst>
   <p:notesMasterIdLst>
-    <p:notesMasterId r:id="rId28"/>
+    <p:notesMasterId r:id="rId29"/>
   </p:notesMasterIdLst>
   <p:sldIdLst>
     <p:sldId id="256" r:id="rId2"/>
@@ -33,7 +33,8 @@
     <p:sldId id="296" r:id="rId24"/>
     <p:sldId id="275" r:id="rId25"/>
     <p:sldId id="298" r:id="rId26"/>
-    <p:sldId id="280" r:id="rId27"/>
+    <p:sldId id="303" r:id="rId27"/>
+    <p:sldId id="280" r:id="rId28"/>
   </p:sldIdLst>
   <p:sldSz cx="9144000" cy="6858000" type="screen4x3"/>
   <p:notesSz cx="6858000" cy="9144000"/>
@@ -2788,32 +2789,32 @@
     </dgm:pt>
   </dgm:ptLst>
   <dgm:cxnLst>
+    <dgm:cxn modelId="{FCE50B2D-3117-9142-9292-BFB760AEFF90}" srcId="{BD553400-187E-5B40-80F5-7CF9C9C27759}" destId="{525CF9F1-6444-D349-855C-29AE1B8E9730}" srcOrd="3" destOrd="0" parTransId="{A669E0B2-C0D2-424A-9B52-29F5B3CC242A}" sibTransId="{6318EF68-52E5-AB49-9F7A-2DF65CE7C804}"/>
+    <dgm:cxn modelId="{CFC631F6-2DF6-4299-9697-0E46732ABF0D}" type="presOf" srcId="{525CF9F1-6444-D349-855C-29AE1B8E9730}" destId="{7790D172-E62C-44DE-A13B-A56757738C2D}" srcOrd="1" destOrd="0" presId="urn:microsoft.com/office/officeart/2005/8/layout/hProcess7#1"/>
+    <dgm:cxn modelId="{46450635-9E77-EB4E-98A2-C4A9B17E2096}" srcId="{0B260FEC-5E70-DA4F-8CB8-F054A7B39D6E}" destId="{EDCB4053-E4D6-6341-8845-F8528FC55D1B}" srcOrd="0" destOrd="0" parTransId="{6BA45170-38A7-C348-B401-566BABAA9F6C}" sibTransId="{C4AC20B7-ECA6-EB47-AB47-2EF0CA0E7906}"/>
+    <dgm:cxn modelId="{2FDA6F74-DF0B-44B7-B30C-FD24E75C4CFC}" type="presOf" srcId="{0B260FEC-5E70-DA4F-8CB8-F054A7B39D6E}" destId="{87558BD7-7307-46B7-BE90-F1A96AE39865}" srcOrd="1" destOrd="0" presId="urn:microsoft.com/office/officeart/2005/8/layout/hProcess7#1"/>
+    <dgm:cxn modelId="{0E28945B-053B-5043-A147-8BCB25C3CA77}" srcId="{BD553400-187E-5B40-80F5-7CF9C9C27759}" destId="{8A08DE89-96C8-C845-9F4D-F1F407B49403}" srcOrd="2" destOrd="0" parTransId="{83CEAF6B-6A7A-534D-870F-A36D686F0DCF}" sibTransId="{6D7BAF1F-1B24-3440-AA0B-CD1E3F9ABBB0}"/>
+    <dgm:cxn modelId="{6856633D-780F-4BDC-BF00-94CDFE9CDFE6}" type="presOf" srcId="{70240BEF-FB12-8844-8001-848D439017C5}" destId="{3BB22FE9-5D4C-4426-89C6-43C406970780}" srcOrd="0" destOrd="0" presId="urn:microsoft.com/office/officeart/2005/8/layout/hProcess7#1"/>
+    <dgm:cxn modelId="{2F67D1CB-938A-4E42-87A1-C63222480D9F}" srcId="{525CF9F1-6444-D349-855C-29AE1B8E9730}" destId="{27DD832C-9850-3144-8267-DF2CC8664F6F}" srcOrd="0" destOrd="0" parTransId="{79B628F2-333C-8A4B-88EF-A0A122386FC8}" sibTransId="{55A089D5-FFA1-4D4C-9EA3-FF289F78F727}"/>
+    <dgm:cxn modelId="{8BA4010E-26B6-47E1-B98A-019175766DF9}" type="presOf" srcId="{E4547900-D5E9-5645-BDF9-2F6E59DC0134}" destId="{E2AA9FB0-9CE2-43E6-9E36-168DDCCB2085}" srcOrd="1" destOrd="0" presId="urn:microsoft.com/office/officeart/2005/8/layout/hProcess7#1"/>
+    <dgm:cxn modelId="{FBBF5300-4CC2-A64F-BAD9-37C3970ABE35}" srcId="{BD553400-187E-5B40-80F5-7CF9C9C27759}" destId="{E4547900-D5E9-5645-BDF9-2F6E59DC0134}" srcOrd="1" destOrd="0" parTransId="{EC7CB3D5-183A-FE4F-B50E-F1237D27EE4F}" sibTransId="{8D84374A-2FBB-624F-A094-59335D602DF0}"/>
+    <dgm:cxn modelId="{22CE713F-DAE7-4F60-85AC-75AF68854F43}" type="presOf" srcId="{88B3E0DE-D448-2E4C-B3AF-129E3B1F7C01}" destId="{B6D772FA-A422-4416-A51C-63B7B9A37589}" srcOrd="0" destOrd="0" presId="urn:microsoft.com/office/officeart/2005/8/layout/hProcess7#1"/>
+    <dgm:cxn modelId="{7BD1F069-6CEE-3E4C-8DE6-BFB02D38F550}" srcId="{E4547900-D5E9-5645-BDF9-2F6E59DC0134}" destId="{8E76C91D-71B7-E548-B22F-768650CB2BFD}" srcOrd="0" destOrd="0" parTransId="{4AD65A1D-0090-944E-B366-E13D979347CC}" sibTransId="{B32521B5-146B-FC4D-B2AA-C35E76F6FD22}"/>
+    <dgm:cxn modelId="{8B529B4B-E3C0-40A9-907E-EEC339045022}" type="presOf" srcId="{BD553400-187E-5B40-80F5-7CF9C9C27759}" destId="{EEB1D8D4-3A2F-460B-984E-D09949873F59}" srcOrd="0" destOrd="0" presId="urn:microsoft.com/office/officeart/2005/8/layout/hProcess7#1"/>
+    <dgm:cxn modelId="{0AF78E1C-4453-9745-AAB8-370B194A5A39}" srcId="{BD553400-187E-5B40-80F5-7CF9C9C27759}" destId="{70240BEF-FB12-8844-8001-848D439017C5}" srcOrd="0" destOrd="0" parTransId="{08DC15F3-1CBC-3B49-B893-1472926A2D14}" sibTransId="{1D7F2C24-4F8B-C441-A3DF-D46B4EC7B338}"/>
+    <dgm:cxn modelId="{6731C034-00EB-4929-BB6F-E65A1C9807BA}" type="presOf" srcId="{EDCB4053-E4D6-6341-8845-F8528FC55D1B}" destId="{652D60F5-340E-40A9-8A70-8721C58FE728}" srcOrd="0" destOrd="0" presId="urn:microsoft.com/office/officeart/2005/8/layout/hProcess7#1"/>
+    <dgm:cxn modelId="{A1C068D8-86CB-411D-9A43-B9C55D5F1FAB}" type="presOf" srcId="{8A08DE89-96C8-C845-9F4D-F1F407B49403}" destId="{7243A0E2-B08A-4749-9704-3BA6415FCFBA}" srcOrd="1" destOrd="0" presId="urn:microsoft.com/office/officeart/2005/8/layout/hProcess7#1"/>
+    <dgm:cxn modelId="{D227D7E3-DC3A-4731-827E-2DC9A7FFC87D}" type="presOf" srcId="{525CF9F1-6444-D349-855C-29AE1B8E9730}" destId="{A08D80C4-FFFD-426B-837A-149E12EAF0DE}" srcOrd="0" destOrd="0" presId="urn:microsoft.com/office/officeart/2005/8/layout/hProcess7#1"/>
+    <dgm:cxn modelId="{3665D4D4-D088-4C31-830A-5550779AAF1F}" type="presOf" srcId="{8A08DE89-96C8-C845-9F4D-F1F407B49403}" destId="{AE8A0755-DCF9-494D-8FE8-BF59CF4EFF21}" srcOrd="0" destOrd="0" presId="urn:microsoft.com/office/officeart/2005/8/layout/hProcess7#1"/>
+    <dgm:cxn modelId="{D08C0C47-8555-4EEC-BAD2-564FA6D3F2C6}" type="presOf" srcId="{E4547900-D5E9-5645-BDF9-2F6E59DC0134}" destId="{1E64F5BB-200B-4C2D-A510-F0F14C80CC90}" srcOrd="0" destOrd="0" presId="urn:microsoft.com/office/officeart/2005/8/layout/hProcess7#1"/>
+    <dgm:cxn modelId="{A7D9A68A-3AE1-48FF-8D68-7250CF2E6D52}" type="presOf" srcId="{8E76C91D-71B7-E548-B22F-768650CB2BFD}" destId="{47861AFF-A08B-4280-9199-188CDD066327}" srcOrd="0" destOrd="0" presId="urn:microsoft.com/office/officeart/2005/8/layout/hProcess7#1"/>
+    <dgm:cxn modelId="{050A1C13-416E-49DD-9BCE-E8E73C668DB2}" type="presOf" srcId="{0B260FEC-5E70-DA4F-8CB8-F054A7B39D6E}" destId="{3FF64A91-C0DE-4D1A-BC63-041A90CAC64B}" srcOrd="0" destOrd="0" presId="urn:microsoft.com/office/officeart/2005/8/layout/hProcess7#1"/>
+    <dgm:cxn modelId="{A733646A-0C0B-9B41-A286-8DD2EA223597}" srcId="{BD553400-187E-5B40-80F5-7CF9C9C27759}" destId="{0B260FEC-5E70-DA4F-8CB8-F054A7B39D6E}" srcOrd="4" destOrd="0" parTransId="{DB56AA97-7A30-9147-B8D5-432FEC94936F}" sibTransId="{2F3BE4A5-F0B6-ED4E-9F2B-89C1B1FAE112}"/>
+    <dgm:cxn modelId="{4C2246AA-92AB-4CA5-B944-23447660B6E5}" type="presOf" srcId="{DC5AB12A-558D-3C4D-83C2-2F484E6362EE}" destId="{6FE60E6B-79B8-44DF-9233-0A18D20BB6A8}" srcOrd="0" destOrd="0" presId="urn:microsoft.com/office/officeart/2005/8/layout/hProcess7#1"/>
+    <dgm:cxn modelId="{A6D45F39-1F37-AE4E-8C2E-BCFE2CBE0928}" srcId="{8A08DE89-96C8-C845-9F4D-F1F407B49403}" destId="{88B3E0DE-D448-2E4C-B3AF-129E3B1F7C01}" srcOrd="0" destOrd="0" parTransId="{72A443BB-1998-B444-A547-BA2CA8C4E220}" sibTransId="{00C35958-9125-864B-89C7-786B15C32C27}"/>
     <dgm:cxn modelId="{D8E7510D-1081-41B6-97D9-0BA02DE7B209}" type="presOf" srcId="{70240BEF-FB12-8844-8001-848D439017C5}" destId="{A4C14527-CC90-40C5-9DED-01173B943986}" srcOrd="1" destOrd="0" presId="urn:microsoft.com/office/officeart/2005/8/layout/hProcess7#1"/>
-    <dgm:cxn modelId="{6731C034-00EB-4929-BB6F-E65A1C9807BA}" type="presOf" srcId="{EDCB4053-E4D6-6341-8845-F8528FC55D1B}" destId="{652D60F5-340E-40A9-8A70-8721C58FE728}" srcOrd="0" destOrd="0" presId="urn:microsoft.com/office/officeart/2005/8/layout/hProcess7#1"/>
-    <dgm:cxn modelId="{22CE713F-DAE7-4F60-85AC-75AF68854F43}" type="presOf" srcId="{88B3E0DE-D448-2E4C-B3AF-129E3B1F7C01}" destId="{B6D772FA-A422-4416-A51C-63B7B9A37589}" srcOrd="0" destOrd="0" presId="urn:microsoft.com/office/officeart/2005/8/layout/hProcess7#1"/>
-    <dgm:cxn modelId="{050A1C13-416E-49DD-9BCE-E8E73C668DB2}" type="presOf" srcId="{0B260FEC-5E70-DA4F-8CB8-F054A7B39D6E}" destId="{3FF64A91-C0DE-4D1A-BC63-041A90CAC64B}" srcOrd="0" destOrd="0" presId="urn:microsoft.com/office/officeart/2005/8/layout/hProcess7#1"/>
-    <dgm:cxn modelId="{A6D45F39-1F37-AE4E-8C2E-BCFE2CBE0928}" srcId="{8A08DE89-96C8-C845-9F4D-F1F407B49403}" destId="{88B3E0DE-D448-2E4C-B3AF-129E3B1F7C01}" srcOrd="0" destOrd="0" parTransId="{72A443BB-1998-B444-A547-BA2CA8C4E220}" sibTransId="{00C35958-9125-864B-89C7-786B15C32C27}"/>
-    <dgm:cxn modelId="{0E28945B-053B-5043-A147-8BCB25C3CA77}" srcId="{BD553400-187E-5B40-80F5-7CF9C9C27759}" destId="{8A08DE89-96C8-C845-9F4D-F1F407B49403}" srcOrd="2" destOrd="0" parTransId="{83CEAF6B-6A7A-534D-870F-A36D686F0DCF}" sibTransId="{6D7BAF1F-1B24-3440-AA0B-CD1E3F9ABBB0}"/>
-    <dgm:cxn modelId="{0AF78E1C-4453-9745-AAB8-370B194A5A39}" srcId="{BD553400-187E-5B40-80F5-7CF9C9C27759}" destId="{70240BEF-FB12-8844-8001-848D439017C5}" srcOrd="0" destOrd="0" parTransId="{08DC15F3-1CBC-3B49-B893-1472926A2D14}" sibTransId="{1D7F2C24-4F8B-C441-A3DF-D46B4EC7B338}"/>
-    <dgm:cxn modelId="{46450635-9E77-EB4E-98A2-C4A9B17E2096}" srcId="{0B260FEC-5E70-DA4F-8CB8-F054A7B39D6E}" destId="{EDCB4053-E4D6-6341-8845-F8528FC55D1B}" srcOrd="0" destOrd="0" parTransId="{6BA45170-38A7-C348-B401-566BABAA9F6C}" sibTransId="{C4AC20B7-ECA6-EB47-AB47-2EF0CA0E7906}"/>
-    <dgm:cxn modelId="{2F67D1CB-938A-4E42-87A1-C63222480D9F}" srcId="{525CF9F1-6444-D349-855C-29AE1B8E9730}" destId="{27DD832C-9850-3144-8267-DF2CC8664F6F}" srcOrd="0" destOrd="0" parTransId="{79B628F2-333C-8A4B-88EF-A0A122386FC8}" sibTransId="{55A089D5-FFA1-4D4C-9EA3-FF289F78F727}"/>
-    <dgm:cxn modelId="{7BD1F069-6CEE-3E4C-8DE6-BFB02D38F550}" srcId="{E4547900-D5E9-5645-BDF9-2F6E59DC0134}" destId="{8E76C91D-71B7-E548-B22F-768650CB2BFD}" srcOrd="0" destOrd="0" parTransId="{4AD65A1D-0090-944E-B366-E13D979347CC}" sibTransId="{B32521B5-146B-FC4D-B2AA-C35E76F6FD22}"/>
-    <dgm:cxn modelId="{A1C068D8-86CB-411D-9A43-B9C55D5F1FAB}" type="presOf" srcId="{8A08DE89-96C8-C845-9F4D-F1F407B49403}" destId="{7243A0E2-B08A-4749-9704-3BA6415FCFBA}" srcOrd="1" destOrd="0" presId="urn:microsoft.com/office/officeart/2005/8/layout/hProcess7#1"/>
     <dgm:cxn modelId="{144CD903-CFF6-9445-BF33-8BE9B78B91C6}" srcId="{70240BEF-FB12-8844-8001-848D439017C5}" destId="{DC5AB12A-558D-3C4D-83C2-2F484E6362EE}" srcOrd="0" destOrd="0" parTransId="{B3F2F9F3-105B-A948-91BA-16A4CB91AC38}" sibTransId="{8B72FAF0-E53D-5643-BB43-E3118DB76780}"/>
-    <dgm:cxn modelId="{8BA4010E-26B6-47E1-B98A-019175766DF9}" type="presOf" srcId="{E4547900-D5E9-5645-BDF9-2F6E59DC0134}" destId="{E2AA9FB0-9CE2-43E6-9E36-168DDCCB2085}" srcOrd="1" destOrd="0" presId="urn:microsoft.com/office/officeart/2005/8/layout/hProcess7#1"/>
-    <dgm:cxn modelId="{3665D4D4-D088-4C31-830A-5550779AAF1F}" type="presOf" srcId="{8A08DE89-96C8-C845-9F4D-F1F407B49403}" destId="{AE8A0755-DCF9-494D-8FE8-BF59CF4EFF21}" srcOrd="0" destOrd="0" presId="urn:microsoft.com/office/officeart/2005/8/layout/hProcess7#1"/>
     <dgm:cxn modelId="{F1B250A3-2459-4274-BFB0-EB0667EEDF75}" type="presOf" srcId="{27DD832C-9850-3144-8267-DF2CC8664F6F}" destId="{3BE4A72E-68E0-46D9-A266-D44EA23629A5}" srcOrd="0" destOrd="0" presId="urn:microsoft.com/office/officeart/2005/8/layout/hProcess7#1"/>
-    <dgm:cxn modelId="{8B529B4B-E3C0-40A9-907E-EEC339045022}" type="presOf" srcId="{BD553400-187E-5B40-80F5-7CF9C9C27759}" destId="{EEB1D8D4-3A2F-460B-984E-D09949873F59}" srcOrd="0" destOrd="0" presId="urn:microsoft.com/office/officeart/2005/8/layout/hProcess7#1"/>
-    <dgm:cxn modelId="{A7D9A68A-3AE1-48FF-8D68-7250CF2E6D52}" type="presOf" srcId="{8E76C91D-71B7-E548-B22F-768650CB2BFD}" destId="{47861AFF-A08B-4280-9199-188CDD066327}" srcOrd="0" destOrd="0" presId="urn:microsoft.com/office/officeart/2005/8/layout/hProcess7#1"/>
-    <dgm:cxn modelId="{FBBF5300-4CC2-A64F-BAD9-37C3970ABE35}" srcId="{BD553400-187E-5B40-80F5-7CF9C9C27759}" destId="{E4547900-D5E9-5645-BDF9-2F6E59DC0134}" srcOrd="1" destOrd="0" parTransId="{EC7CB3D5-183A-FE4F-B50E-F1237D27EE4F}" sibTransId="{8D84374A-2FBB-624F-A094-59335D602DF0}"/>
-    <dgm:cxn modelId="{FCE50B2D-3117-9142-9292-BFB760AEFF90}" srcId="{BD553400-187E-5B40-80F5-7CF9C9C27759}" destId="{525CF9F1-6444-D349-855C-29AE1B8E9730}" srcOrd="3" destOrd="0" parTransId="{A669E0B2-C0D2-424A-9B52-29F5B3CC242A}" sibTransId="{6318EF68-52E5-AB49-9F7A-2DF65CE7C804}"/>
-    <dgm:cxn modelId="{A733646A-0C0B-9B41-A286-8DD2EA223597}" srcId="{BD553400-187E-5B40-80F5-7CF9C9C27759}" destId="{0B260FEC-5E70-DA4F-8CB8-F054A7B39D6E}" srcOrd="4" destOrd="0" parTransId="{DB56AA97-7A30-9147-B8D5-432FEC94936F}" sibTransId="{2F3BE4A5-F0B6-ED4E-9F2B-89C1B1FAE112}"/>
-    <dgm:cxn modelId="{D227D7E3-DC3A-4731-827E-2DC9A7FFC87D}" type="presOf" srcId="{525CF9F1-6444-D349-855C-29AE1B8E9730}" destId="{A08D80C4-FFFD-426B-837A-149E12EAF0DE}" srcOrd="0" destOrd="0" presId="urn:microsoft.com/office/officeart/2005/8/layout/hProcess7#1"/>
-    <dgm:cxn modelId="{4C2246AA-92AB-4CA5-B944-23447660B6E5}" type="presOf" srcId="{DC5AB12A-558D-3C4D-83C2-2F484E6362EE}" destId="{6FE60E6B-79B8-44DF-9233-0A18D20BB6A8}" srcOrd="0" destOrd="0" presId="urn:microsoft.com/office/officeart/2005/8/layout/hProcess7#1"/>
-    <dgm:cxn modelId="{CFC631F6-2DF6-4299-9697-0E46732ABF0D}" type="presOf" srcId="{525CF9F1-6444-D349-855C-29AE1B8E9730}" destId="{7790D172-E62C-44DE-A13B-A56757738C2D}" srcOrd="1" destOrd="0" presId="urn:microsoft.com/office/officeart/2005/8/layout/hProcess7#1"/>
-    <dgm:cxn modelId="{2FDA6F74-DF0B-44B7-B30C-FD24E75C4CFC}" type="presOf" srcId="{0B260FEC-5E70-DA4F-8CB8-F054A7B39D6E}" destId="{87558BD7-7307-46B7-BE90-F1A96AE39865}" srcOrd="1" destOrd="0" presId="urn:microsoft.com/office/officeart/2005/8/layout/hProcess7#1"/>
-    <dgm:cxn modelId="{D08C0C47-8555-4EEC-BAD2-564FA6D3F2C6}" type="presOf" srcId="{E4547900-D5E9-5645-BDF9-2F6E59DC0134}" destId="{1E64F5BB-200B-4C2D-A510-F0F14C80CC90}" srcOrd="0" destOrd="0" presId="urn:microsoft.com/office/officeart/2005/8/layout/hProcess7#1"/>
-    <dgm:cxn modelId="{6856633D-780F-4BDC-BF00-94CDFE9CDFE6}" type="presOf" srcId="{70240BEF-FB12-8844-8001-848D439017C5}" destId="{3BB22FE9-5D4C-4426-89C6-43C406970780}" srcOrd="0" destOrd="0" presId="urn:microsoft.com/office/officeart/2005/8/layout/hProcess7#1"/>
     <dgm:cxn modelId="{7A95BFCF-EF2C-437E-B13C-94FD10411E25}" type="presParOf" srcId="{EEB1D8D4-3A2F-460B-984E-D09949873F59}" destId="{3276895E-2E67-4529-B821-19C510446FA4}" srcOrd="0" destOrd="0" presId="urn:microsoft.com/office/officeart/2005/8/layout/hProcess7#1"/>
     <dgm:cxn modelId="{FF0286F7-6304-4317-8C59-65A9F122E3AC}" type="presParOf" srcId="{3276895E-2E67-4529-B821-19C510446FA4}" destId="{3BB22FE9-5D4C-4426-89C6-43C406970780}" srcOrd="0" destOrd="0" presId="urn:microsoft.com/office/officeart/2005/8/layout/hProcess7#1"/>
     <dgm:cxn modelId="{55A412CB-0FBB-4B05-BCF5-9DDAA9B1A342}" type="presParOf" srcId="{3276895E-2E67-4529-B821-19C510446FA4}" destId="{A4C14527-CC90-40C5-9DED-01173B943986}" srcOrd="1" destOrd="0" presId="urn:microsoft.com/office/officeart/2005/8/layout/hProcess7#1"/>
@@ -2863,7 +2864,7 @@
   <dgm:whole/>
   <dgm:extLst>
     <a:ext uri="http://schemas.microsoft.com/office/drawing/2008/diagram">
-      <dsp:dataModelExt xmlns:dsp="http://schemas.microsoft.com/office/drawing/2008/diagram" relId="rId6" minVer="http://schemas.openxmlformats.org/drawingml/2006/diagram"/>
+      <dsp:dataModelExt xmlns:dsp="http://schemas.microsoft.com/office/drawing/2008/diagram" xmlns="" relId="rId6" minVer="http://schemas.openxmlformats.org/drawingml/2006/diagram"/>
     </a:ext>
   </dgm:extLst>
 </dgm:dataModel>
@@ -3841,32 +3842,32 @@
     </dgm:pt>
   </dgm:ptLst>
   <dgm:cxnLst>
+    <dgm:cxn modelId="{FCE50B2D-3117-9142-9292-BFB760AEFF90}" srcId="{BD553400-187E-5B40-80F5-7CF9C9C27759}" destId="{525CF9F1-6444-D349-855C-29AE1B8E9730}" srcOrd="3" destOrd="0" parTransId="{A669E0B2-C0D2-424A-9B52-29F5B3CC242A}" sibTransId="{6318EF68-52E5-AB49-9F7A-2DF65CE7C804}"/>
+    <dgm:cxn modelId="{9410B932-FCB6-4EF1-99FB-BBDBF5E0A15B}" type="presOf" srcId="{27DD832C-9850-3144-8267-DF2CC8664F6F}" destId="{A5194D6D-3F79-4F55-BD1F-5FD6F297B167}" srcOrd="0" destOrd="0" presId="urn:microsoft.com/office/officeart/2005/8/layout/hProcess7#2"/>
+    <dgm:cxn modelId="{46450635-9E77-EB4E-98A2-C4A9B17E2096}" srcId="{0B260FEC-5E70-DA4F-8CB8-F054A7B39D6E}" destId="{EDCB4053-E4D6-6341-8845-F8528FC55D1B}" srcOrd="0" destOrd="0" parTransId="{6BA45170-38A7-C348-B401-566BABAA9F6C}" sibTransId="{C4AC20B7-ECA6-EB47-AB47-2EF0CA0E7906}"/>
+    <dgm:cxn modelId="{0E28945B-053B-5043-A147-8BCB25C3CA77}" srcId="{BD553400-187E-5B40-80F5-7CF9C9C27759}" destId="{8A08DE89-96C8-C845-9F4D-F1F407B49403}" srcOrd="2" destOrd="0" parTransId="{83CEAF6B-6A7A-534D-870F-A36D686F0DCF}" sibTransId="{6D7BAF1F-1B24-3440-AA0B-CD1E3F9ABBB0}"/>
+    <dgm:cxn modelId="{95A88996-5141-4F83-86FA-6E7B7D93C1DF}" type="presOf" srcId="{8A08DE89-96C8-C845-9F4D-F1F407B49403}" destId="{601F5274-A514-4512-825C-090C4F983BF9}" srcOrd="0" destOrd="0" presId="urn:microsoft.com/office/officeart/2005/8/layout/hProcess7#2"/>
+    <dgm:cxn modelId="{2F67D1CB-938A-4E42-87A1-C63222480D9F}" srcId="{525CF9F1-6444-D349-855C-29AE1B8E9730}" destId="{27DD832C-9850-3144-8267-DF2CC8664F6F}" srcOrd="0" destOrd="0" parTransId="{79B628F2-333C-8A4B-88EF-A0A122386FC8}" sibTransId="{55A089D5-FFA1-4D4C-9EA3-FF289F78F727}"/>
+    <dgm:cxn modelId="{81DE6B93-E024-4515-8BF6-523600062D16}" type="presOf" srcId="{88B3E0DE-D448-2E4C-B3AF-129E3B1F7C01}" destId="{0AB5B231-02D2-46CA-9189-7011923D4004}" srcOrd="0" destOrd="0" presId="urn:microsoft.com/office/officeart/2005/8/layout/hProcess7#2"/>
+    <dgm:cxn modelId="{E62B23F1-C308-456C-8179-A2A40644D0ED}" type="presOf" srcId="{70240BEF-FB12-8844-8001-848D439017C5}" destId="{CD40CDEB-CD9E-49AE-A016-37B36CFE9D6C}" srcOrd="1" destOrd="0" presId="urn:microsoft.com/office/officeart/2005/8/layout/hProcess7#2"/>
+    <dgm:cxn modelId="{2CE336DC-B34C-4268-A4CB-20982B295DD0}" type="presOf" srcId="{0B260FEC-5E70-DA4F-8CB8-F054A7B39D6E}" destId="{0D4B94A8-E592-46D7-8BCC-D3D7D93C959C}" srcOrd="1" destOrd="0" presId="urn:microsoft.com/office/officeart/2005/8/layout/hProcess7#2"/>
+    <dgm:cxn modelId="{FBBF5300-4CC2-A64F-BAD9-37C3970ABE35}" srcId="{BD553400-187E-5B40-80F5-7CF9C9C27759}" destId="{E4547900-D5E9-5645-BDF9-2F6E59DC0134}" srcOrd="1" destOrd="0" parTransId="{EC7CB3D5-183A-FE4F-B50E-F1237D27EE4F}" sibTransId="{8D84374A-2FBB-624F-A094-59335D602DF0}"/>
+    <dgm:cxn modelId="{7BD1F069-6CEE-3E4C-8DE6-BFB02D38F550}" srcId="{E4547900-D5E9-5645-BDF9-2F6E59DC0134}" destId="{8E76C91D-71B7-E548-B22F-768650CB2BFD}" srcOrd="0" destOrd="0" parTransId="{4AD65A1D-0090-944E-B366-E13D979347CC}" sibTransId="{B32521B5-146B-FC4D-B2AA-C35E76F6FD22}"/>
+    <dgm:cxn modelId="{ACB35031-619F-4AB8-A2D9-8F215586375C}" type="presOf" srcId="{0B260FEC-5E70-DA4F-8CB8-F054A7B39D6E}" destId="{C4855321-D951-4D3B-8F86-E78AEE620989}" srcOrd="0" destOrd="0" presId="urn:microsoft.com/office/officeart/2005/8/layout/hProcess7#2"/>
     <dgm:cxn modelId="{0AF78E1C-4453-9745-AAB8-370B194A5A39}" srcId="{BD553400-187E-5B40-80F5-7CF9C9C27759}" destId="{70240BEF-FB12-8844-8001-848D439017C5}" srcOrd="0" destOrd="0" parTransId="{08DC15F3-1CBC-3B49-B893-1472926A2D14}" sibTransId="{1D7F2C24-4F8B-C441-A3DF-D46B4EC7B338}"/>
-    <dgm:cxn modelId="{144CD903-CFF6-9445-BF33-8BE9B78B91C6}" srcId="{70240BEF-FB12-8844-8001-848D439017C5}" destId="{DC5AB12A-558D-3C4D-83C2-2F484E6362EE}" srcOrd="0" destOrd="0" parTransId="{B3F2F9F3-105B-A948-91BA-16A4CB91AC38}" sibTransId="{8B72FAF0-E53D-5643-BB43-E3118DB76780}"/>
+    <dgm:cxn modelId="{B73A04E6-67A2-4714-83A6-12996767A06B}" type="presOf" srcId="{BD553400-187E-5B40-80F5-7CF9C9C27759}" destId="{87A35351-C388-496C-B3BD-6802839A99F2}" srcOrd="0" destOrd="0" presId="urn:microsoft.com/office/officeart/2005/8/layout/hProcess7#2"/>
+    <dgm:cxn modelId="{844D2F38-680C-4922-8D00-0C164BB82398}" type="presOf" srcId="{8A08DE89-96C8-C845-9F4D-F1F407B49403}" destId="{BFB90BC4-42EA-4D29-83EC-31049C9115E1}" srcOrd="1" destOrd="0" presId="urn:microsoft.com/office/officeart/2005/8/layout/hProcess7#2"/>
+    <dgm:cxn modelId="{48063C26-9195-4BDD-855A-F25E592D3DE9}" type="presOf" srcId="{EDCB4053-E4D6-6341-8845-F8528FC55D1B}" destId="{DF2E792B-944F-465F-AD59-220F8DF568EC}" srcOrd="0" destOrd="0" presId="urn:microsoft.com/office/officeart/2005/8/layout/hProcess7#2"/>
+    <dgm:cxn modelId="{19C488D9-BA8C-409C-81BA-DB1E3B3CC4B2}" type="presOf" srcId="{DC5AB12A-558D-3C4D-83C2-2F484E6362EE}" destId="{85F2A3EF-2951-417B-A1E4-B8694C0EF516}" srcOrd="0" destOrd="0" presId="urn:microsoft.com/office/officeart/2005/8/layout/hProcess7#2"/>
     <dgm:cxn modelId="{945C8578-9331-4B92-AD97-33AD99902760}" type="presOf" srcId="{70240BEF-FB12-8844-8001-848D439017C5}" destId="{06CF08EE-6313-49F7-905C-0D3010451A5D}" srcOrd="0" destOrd="0" presId="urn:microsoft.com/office/officeart/2005/8/layout/hProcess7#2"/>
     <dgm:cxn modelId="{B84F49E1-C32E-44A1-8B3F-86F9752376DD}" type="presOf" srcId="{E4547900-D5E9-5645-BDF9-2F6E59DC0134}" destId="{7F307ED5-DF10-4B40-B1E5-8428B1E222FB}" srcOrd="1" destOrd="0" presId="urn:microsoft.com/office/officeart/2005/8/layout/hProcess7#2"/>
-    <dgm:cxn modelId="{0E28945B-053B-5043-A147-8BCB25C3CA77}" srcId="{BD553400-187E-5B40-80F5-7CF9C9C27759}" destId="{8A08DE89-96C8-C845-9F4D-F1F407B49403}" srcOrd="2" destOrd="0" parTransId="{83CEAF6B-6A7A-534D-870F-A36D686F0DCF}" sibTransId="{6D7BAF1F-1B24-3440-AA0B-CD1E3F9ABBB0}"/>
-    <dgm:cxn modelId="{19C488D9-BA8C-409C-81BA-DB1E3B3CC4B2}" type="presOf" srcId="{DC5AB12A-558D-3C4D-83C2-2F484E6362EE}" destId="{85F2A3EF-2951-417B-A1E4-B8694C0EF516}" srcOrd="0" destOrd="0" presId="urn:microsoft.com/office/officeart/2005/8/layout/hProcess7#2"/>
-    <dgm:cxn modelId="{7BD1F069-6CEE-3E4C-8DE6-BFB02D38F550}" srcId="{E4547900-D5E9-5645-BDF9-2F6E59DC0134}" destId="{8E76C91D-71B7-E548-B22F-768650CB2BFD}" srcOrd="0" destOrd="0" parTransId="{4AD65A1D-0090-944E-B366-E13D979347CC}" sibTransId="{B32521B5-146B-FC4D-B2AA-C35E76F6FD22}"/>
-    <dgm:cxn modelId="{2F67D1CB-938A-4E42-87A1-C63222480D9F}" srcId="{525CF9F1-6444-D349-855C-29AE1B8E9730}" destId="{27DD832C-9850-3144-8267-DF2CC8664F6F}" srcOrd="0" destOrd="0" parTransId="{79B628F2-333C-8A4B-88EF-A0A122386FC8}" sibTransId="{55A089D5-FFA1-4D4C-9EA3-FF289F78F727}"/>
-    <dgm:cxn modelId="{ACB35031-619F-4AB8-A2D9-8F215586375C}" type="presOf" srcId="{0B260FEC-5E70-DA4F-8CB8-F054A7B39D6E}" destId="{C4855321-D951-4D3B-8F86-E78AEE620989}" srcOrd="0" destOrd="0" presId="urn:microsoft.com/office/officeart/2005/8/layout/hProcess7#2"/>
-    <dgm:cxn modelId="{E62B23F1-C308-456C-8179-A2A40644D0ED}" type="presOf" srcId="{70240BEF-FB12-8844-8001-848D439017C5}" destId="{CD40CDEB-CD9E-49AE-A016-37B36CFE9D6C}" srcOrd="1" destOrd="0" presId="urn:microsoft.com/office/officeart/2005/8/layout/hProcess7#2"/>
-    <dgm:cxn modelId="{9410B932-FCB6-4EF1-99FB-BBDBF5E0A15B}" type="presOf" srcId="{27DD832C-9850-3144-8267-DF2CC8664F6F}" destId="{A5194D6D-3F79-4F55-BD1F-5FD6F297B167}" srcOrd="0" destOrd="0" presId="urn:microsoft.com/office/officeart/2005/8/layout/hProcess7#2"/>
-    <dgm:cxn modelId="{2CE336DC-B34C-4268-A4CB-20982B295DD0}" type="presOf" srcId="{0B260FEC-5E70-DA4F-8CB8-F054A7B39D6E}" destId="{0D4B94A8-E592-46D7-8BCC-D3D7D93C959C}" srcOrd="1" destOrd="0" presId="urn:microsoft.com/office/officeart/2005/8/layout/hProcess7#2"/>
-    <dgm:cxn modelId="{844D2F38-680C-4922-8D00-0C164BB82398}" type="presOf" srcId="{8A08DE89-96C8-C845-9F4D-F1F407B49403}" destId="{BFB90BC4-42EA-4D29-83EC-31049C9115E1}" srcOrd="1" destOrd="0" presId="urn:microsoft.com/office/officeart/2005/8/layout/hProcess7#2"/>
-    <dgm:cxn modelId="{FBBF5300-4CC2-A64F-BAD9-37C3970ABE35}" srcId="{BD553400-187E-5B40-80F5-7CF9C9C27759}" destId="{E4547900-D5E9-5645-BDF9-2F6E59DC0134}" srcOrd="1" destOrd="0" parTransId="{EC7CB3D5-183A-FE4F-B50E-F1237D27EE4F}" sibTransId="{8D84374A-2FBB-624F-A094-59335D602DF0}"/>
-    <dgm:cxn modelId="{46450635-9E77-EB4E-98A2-C4A9B17E2096}" srcId="{0B260FEC-5E70-DA4F-8CB8-F054A7B39D6E}" destId="{EDCB4053-E4D6-6341-8845-F8528FC55D1B}" srcOrd="0" destOrd="0" parTransId="{6BA45170-38A7-C348-B401-566BABAA9F6C}" sibTransId="{C4AC20B7-ECA6-EB47-AB47-2EF0CA0E7906}"/>
-    <dgm:cxn modelId="{B73A04E6-67A2-4714-83A6-12996767A06B}" type="presOf" srcId="{BD553400-187E-5B40-80F5-7CF9C9C27759}" destId="{87A35351-C388-496C-B3BD-6802839A99F2}" srcOrd="0" destOrd="0" presId="urn:microsoft.com/office/officeart/2005/8/layout/hProcess7#2"/>
-    <dgm:cxn modelId="{81DE6B93-E024-4515-8BF6-523600062D16}" type="presOf" srcId="{88B3E0DE-D448-2E4C-B3AF-129E3B1F7C01}" destId="{0AB5B231-02D2-46CA-9189-7011923D4004}" srcOrd="0" destOrd="0" presId="urn:microsoft.com/office/officeart/2005/8/layout/hProcess7#2"/>
+    <dgm:cxn modelId="{BD9F495F-259A-4418-A698-13121511294C}" type="presOf" srcId="{525CF9F1-6444-D349-855C-29AE1B8E9730}" destId="{A29B0E12-B92B-46F2-B9D0-F0BED1DBE624}" srcOrd="0" destOrd="0" presId="urn:microsoft.com/office/officeart/2005/8/layout/hProcess7#2"/>
     <dgm:cxn modelId="{A733646A-0C0B-9B41-A286-8DD2EA223597}" srcId="{BD553400-187E-5B40-80F5-7CF9C9C27759}" destId="{0B260FEC-5E70-DA4F-8CB8-F054A7B39D6E}" srcOrd="4" destOrd="0" parTransId="{DB56AA97-7A30-9147-B8D5-432FEC94936F}" sibTransId="{2F3BE4A5-F0B6-ED4E-9F2B-89C1B1FAE112}"/>
-    <dgm:cxn modelId="{BD9F495F-259A-4418-A698-13121511294C}" type="presOf" srcId="{525CF9F1-6444-D349-855C-29AE1B8E9730}" destId="{A29B0E12-B92B-46F2-B9D0-F0BED1DBE624}" srcOrd="0" destOrd="0" presId="urn:microsoft.com/office/officeart/2005/8/layout/hProcess7#2"/>
+    <dgm:cxn modelId="{A6D45F39-1F37-AE4E-8C2E-BCFE2CBE0928}" srcId="{8A08DE89-96C8-C845-9F4D-F1F407B49403}" destId="{88B3E0DE-D448-2E4C-B3AF-129E3B1F7C01}" srcOrd="0" destOrd="0" parTransId="{72A443BB-1998-B444-A547-BA2CA8C4E220}" sibTransId="{00C35958-9125-864B-89C7-786B15C32C27}"/>
+    <dgm:cxn modelId="{9011A0B6-3EBC-48B7-842C-7884DE6CDD2B}" type="presOf" srcId="{525CF9F1-6444-D349-855C-29AE1B8E9730}" destId="{93ED485D-0F7C-45DB-BA4A-7A21FFC11E89}" srcOrd="1" destOrd="0" presId="urn:microsoft.com/office/officeart/2005/8/layout/hProcess7#2"/>
+    <dgm:cxn modelId="{1C235089-71B7-43B1-B8A3-0E24E38CD680}" type="presOf" srcId="{8E76C91D-71B7-E548-B22F-768650CB2BFD}" destId="{48E066F2-A684-4B16-B8E9-9F6FE1633FCA}" srcOrd="0" destOrd="0" presId="urn:microsoft.com/office/officeart/2005/8/layout/hProcess7#2"/>
+    <dgm:cxn modelId="{144CD903-CFF6-9445-BF33-8BE9B78B91C6}" srcId="{70240BEF-FB12-8844-8001-848D439017C5}" destId="{DC5AB12A-558D-3C4D-83C2-2F484E6362EE}" srcOrd="0" destOrd="0" parTransId="{B3F2F9F3-105B-A948-91BA-16A4CB91AC38}" sibTransId="{8B72FAF0-E53D-5643-BB43-E3118DB76780}"/>
     <dgm:cxn modelId="{3EC3FBC8-FF5B-4DE6-ABDB-606618C0B027}" type="presOf" srcId="{E4547900-D5E9-5645-BDF9-2F6E59DC0134}" destId="{0791AC5D-D023-464F-8CEA-52C6AF32F78A}" srcOrd="0" destOrd="0" presId="urn:microsoft.com/office/officeart/2005/8/layout/hProcess7#2"/>
-    <dgm:cxn modelId="{1C235089-71B7-43B1-B8A3-0E24E38CD680}" type="presOf" srcId="{8E76C91D-71B7-E548-B22F-768650CB2BFD}" destId="{48E066F2-A684-4B16-B8E9-9F6FE1633FCA}" srcOrd="0" destOrd="0" presId="urn:microsoft.com/office/officeart/2005/8/layout/hProcess7#2"/>
-    <dgm:cxn modelId="{9011A0B6-3EBC-48B7-842C-7884DE6CDD2B}" type="presOf" srcId="{525CF9F1-6444-D349-855C-29AE1B8E9730}" destId="{93ED485D-0F7C-45DB-BA4A-7A21FFC11E89}" srcOrd="1" destOrd="0" presId="urn:microsoft.com/office/officeart/2005/8/layout/hProcess7#2"/>
-    <dgm:cxn modelId="{FCE50B2D-3117-9142-9292-BFB760AEFF90}" srcId="{BD553400-187E-5B40-80F5-7CF9C9C27759}" destId="{525CF9F1-6444-D349-855C-29AE1B8E9730}" srcOrd="3" destOrd="0" parTransId="{A669E0B2-C0D2-424A-9B52-29F5B3CC242A}" sibTransId="{6318EF68-52E5-AB49-9F7A-2DF65CE7C804}"/>
-    <dgm:cxn modelId="{95A88996-5141-4F83-86FA-6E7B7D93C1DF}" type="presOf" srcId="{8A08DE89-96C8-C845-9F4D-F1F407B49403}" destId="{601F5274-A514-4512-825C-090C4F983BF9}" srcOrd="0" destOrd="0" presId="urn:microsoft.com/office/officeart/2005/8/layout/hProcess7#2"/>
-    <dgm:cxn modelId="{A6D45F39-1F37-AE4E-8C2E-BCFE2CBE0928}" srcId="{8A08DE89-96C8-C845-9F4D-F1F407B49403}" destId="{88B3E0DE-D448-2E4C-B3AF-129E3B1F7C01}" srcOrd="0" destOrd="0" parTransId="{72A443BB-1998-B444-A547-BA2CA8C4E220}" sibTransId="{00C35958-9125-864B-89C7-786B15C32C27}"/>
-    <dgm:cxn modelId="{48063C26-9195-4BDD-855A-F25E592D3DE9}" type="presOf" srcId="{EDCB4053-E4D6-6341-8845-F8528FC55D1B}" destId="{DF2E792B-944F-465F-AD59-220F8DF568EC}" srcOrd="0" destOrd="0" presId="urn:microsoft.com/office/officeart/2005/8/layout/hProcess7#2"/>
     <dgm:cxn modelId="{1F7DBCB8-B791-4B3D-93BC-B5CAA2DEBBFE}" type="presParOf" srcId="{87A35351-C388-496C-B3BD-6802839A99F2}" destId="{19C54373-E3FA-4279-87FC-A695D204D618}" srcOrd="0" destOrd="0" presId="urn:microsoft.com/office/officeart/2005/8/layout/hProcess7#2"/>
     <dgm:cxn modelId="{D416C3C0-0BA9-4A47-A312-3F75E4FD0726}" type="presParOf" srcId="{19C54373-E3FA-4279-87FC-A695D204D618}" destId="{06CF08EE-6313-49F7-905C-0D3010451A5D}" srcOrd="0" destOrd="0" presId="urn:microsoft.com/office/officeart/2005/8/layout/hProcess7#2"/>
     <dgm:cxn modelId="{84B0B0AE-BBBD-4CA3-BAF5-5B88ECBB6E25}" type="presParOf" srcId="{19C54373-E3FA-4279-87FC-A695D204D618}" destId="{CD40CDEB-CD9E-49AE-A016-37B36CFE9D6C}" srcOrd="1" destOrd="0" presId="urn:microsoft.com/office/officeart/2005/8/layout/hProcess7#2"/>
@@ -3916,14 +3917,14 @@
   <dgm:whole/>
   <dgm:extLst>
     <a:ext uri="http://schemas.microsoft.com/office/drawing/2008/diagram">
-      <dsp:dataModelExt xmlns:dsp="http://schemas.microsoft.com/office/drawing/2008/diagram" relId="rId11" minVer="http://schemas.openxmlformats.org/drawingml/2006/diagram"/>
+      <dsp:dataModelExt xmlns:dsp="http://schemas.microsoft.com/office/drawing/2008/diagram" xmlns="" relId="rId11" minVer="http://schemas.openxmlformats.org/drawingml/2006/diagram"/>
     </a:ext>
   </dgm:extLst>
 </dgm:dataModel>
 </file>
 
 <file path=ppt/diagrams/drawing1.xml><?xml version="1.0" encoding="utf-8"?>
-<dsp:drawing xmlns:dgm="http://schemas.openxmlformats.org/drawingml/2006/diagram" xmlns:dsp="http://schemas.microsoft.com/office/drawing/2008/diagram" xmlns:a="http://schemas.openxmlformats.org/drawingml/2006/main">
+<dsp:drawing xmlns:dgm="http://schemas.openxmlformats.org/drawingml/2006/diagram" xmlns:a="http://schemas.openxmlformats.org/drawingml/2006/main" xmlns:dsp="http://schemas.microsoft.com/office/drawing/2008/diagram">
   <dsp:spTree>
     <dsp:nvGrpSpPr>
       <dsp:cNvPr id="0" name=""/>
@@ -4988,7 +4989,7 @@
 </file>
 
 <file path=ppt/diagrams/drawing2.xml><?xml version="1.0" encoding="utf-8"?>
-<dsp:drawing xmlns:dgm="http://schemas.openxmlformats.org/drawingml/2006/diagram" xmlns:dsp="http://schemas.microsoft.com/office/drawing/2008/diagram" xmlns:a="http://schemas.openxmlformats.org/drawingml/2006/main">
+<dsp:drawing xmlns:dgm="http://schemas.openxmlformats.org/drawingml/2006/diagram" xmlns:a="http://schemas.openxmlformats.org/drawingml/2006/main" xmlns:dsp="http://schemas.microsoft.com/office/drawing/2008/diagram">
   <dsp:spTree>
     <dsp:nvGrpSpPr>
       <dsp:cNvPr id="0" name=""/>
@@ -5415,7 +5416,7 @@
           <a:gsLst>
             <a:gs pos="0">
               <a:schemeClr val="accent3">
-                <a:hueOff val="5625133"/>
+                <a:hueOff val="5625132"/>
                 <a:satOff val="-8440"/>
                 <a:lumOff val="-1373"/>
                 <a:alphaOff val="0"/>
@@ -5425,7 +5426,7 @@
             </a:gs>
             <a:gs pos="80000">
               <a:schemeClr val="accent3">
-                <a:hueOff val="5625133"/>
+                <a:hueOff val="5625132"/>
                 <a:satOff val="-8440"/>
                 <a:lumOff val="-1373"/>
                 <a:alphaOff val="0"/>
@@ -5435,7 +5436,7 @@
             </a:gs>
             <a:gs pos="100000">
               <a:schemeClr val="accent3">
-                <a:hueOff val="5625133"/>
+                <a:hueOff val="5625132"/>
                 <a:satOff val="-8440"/>
                 <a:lumOff val="-1373"/>
                 <a:alphaOff val="0"/>
@@ -5528,7 +5529,7 @@
         <a:ln w="9525" cap="flat" cmpd="sng" algn="ctr">
           <a:solidFill>
             <a:schemeClr val="accent3">
-              <a:hueOff val="3750089"/>
+              <a:hueOff val="3750088"/>
               <a:satOff val="-5627"/>
               <a:lumOff val="-915"/>
               <a:alphaOff val="0"/>
@@ -5639,7 +5640,7 @@
           <a:gsLst>
             <a:gs pos="0">
               <a:schemeClr val="accent3">
-                <a:hueOff val="8437700"/>
+                <a:hueOff val="8437698"/>
                 <a:satOff val="-12660"/>
                 <a:lumOff val="-2059"/>
                 <a:alphaOff val="0"/>
@@ -5649,7 +5650,7 @@
             </a:gs>
             <a:gs pos="80000">
               <a:schemeClr val="accent3">
-                <a:hueOff val="8437700"/>
+                <a:hueOff val="8437698"/>
                 <a:satOff val="-12660"/>
                 <a:lumOff val="-2059"/>
                 <a:alphaOff val="0"/>
@@ -5659,7 +5660,7 @@
             </a:gs>
             <a:gs pos="100000">
               <a:schemeClr val="accent3">
-                <a:hueOff val="8437700"/>
+                <a:hueOff val="8437698"/>
                 <a:satOff val="-12660"/>
                 <a:lumOff val="-2059"/>
                 <a:alphaOff val="0"/>
@@ -5752,7 +5753,7 @@
         <a:ln w="9525" cap="flat" cmpd="sng" algn="ctr">
           <a:solidFill>
             <a:schemeClr val="accent3">
-              <a:hueOff val="7500177"/>
+              <a:hueOff val="7500176"/>
               <a:satOff val="-11253"/>
               <a:lumOff val="-1830"/>
               <a:alphaOff val="0"/>
@@ -5863,7 +5864,7 @@
           <a:gsLst>
             <a:gs pos="0">
               <a:schemeClr val="accent3">
-                <a:hueOff val="11250266"/>
+                <a:hueOff val="11250264"/>
                 <a:satOff val="-16880"/>
                 <a:lumOff val="-2745"/>
                 <a:alphaOff val="0"/>
@@ -5873,7 +5874,7 @@
             </a:gs>
             <a:gs pos="80000">
               <a:schemeClr val="accent3">
-                <a:hueOff val="11250266"/>
+                <a:hueOff val="11250264"/>
                 <a:satOff val="-16880"/>
                 <a:lumOff val="-2745"/>
                 <a:alphaOff val="0"/>
@@ -5883,7 +5884,7 @@
             </a:gs>
             <a:gs pos="100000">
               <a:schemeClr val="accent3">
-                <a:hueOff val="11250266"/>
+                <a:hueOff val="11250264"/>
                 <a:satOff val="-16880"/>
                 <a:lumOff val="-2745"/>
                 <a:alphaOff val="0"/>
@@ -5976,7 +5977,7 @@
         <a:ln w="9525" cap="flat" cmpd="sng" algn="ctr">
           <a:solidFill>
             <a:schemeClr val="accent3">
-              <a:hueOff val="11250266"/>
+              <a:hueOff val="11250264"/>
               <a:satOff val="-16880"/>
               <a:lumOff val="-2745"/>
               <a:alphaOff val="0"/>
@@ -8901,7 +8902,7 @@
             <a:fld id="{D2474EFA-CF2C-4B6D-A206-1640E91EBD1F}" type="datetimeFigureOut">
               <a:rPr lang="en-IN" smtClean="0"/>
               <a:pPr/>
-              <a:t>28/01/13</a:t>
+              <a:t>29-01-2013</a:t>
             </a:fld>
             <a:endParaRPr lang="en-IN"/>
           </a:p>
@@ -9072,7 +9073,7 @@
     </p:spTree>
     <p:extLst>
       <p:ext uri="{BB962C8B-B14F-4D97-AF65-F5344CB8AC3E}">
-        <p14:creationId xmlns:p14="http://schemas.microsoft.com/office/powerpoint/2010/main" val="4064607548"/>
+        <p14:creationId xmlns:p14="http://schemas.microsoft.com/office/powerpoint/2010/main" xmlns="" val="4064607548"/>
       </p:ext>
     </p:extLst>
   </p:cSld>
@@ -9493,7 +9494,7 @@
     </p:spTree>
     <p:extLst>
       <p:ext uri="{BB962C8B-B14F-4D97-AF65-F5344CB8AC3E}">
-        <p14:creationId xmlns:p14="http://schemas.microsoft.com/office/powerpoint/2010/main" val="716822200"/>
+        <p14:creationId xmlns:p14="http://schemas.microsoft.com/office/powerpoint/2010/main" xmlns="" val="716822200"/>
       </p:ext>
     </p:extLst>
   </p:cSld>
@@ -9736,6 +9737,88 @@
               <a:rPr lang="en-IN" smtClean="0"/>
               <a:pPr/>
               <a:t>26</a:t>
+            </a:fld>
+            <a:endParaRPr lang="en-IN"/>
+          </a:p>
+        </p:txBody>
+      </p:sp>
+    </p:spTree>
+  </p:cSld>
+  <p:clrMapOvr>
+    <a:masterClrMapping/>
+  </p:clrMapOvr>
+</p:notes>
+</file>
+
+<file path=ppt/notesSlides/notesSlide8.xml><?xml version="1.0" encoding="utf-8"?>
+<p:notes xmlns:a="http://schemas.openxmlformats.org/drawingml/2006/main" xmlns:r="http://schemas.openxmlformats.org/officeDocument/2006/relationships" xmlns:p="http://schemas.openxmlformats.org/presentationml/2006/main">
+  <p:cSld>
+    <p:spTree>
+      <p:nvGrpSpPr>
+        <p:cNvPr id="1" name=""/>
+        <p:cNvGrpSpPr/>
+        <p:nvPr/>
+      </p:nvGrpSpPr>
+      <p:grpSpPr>
+        <a:xfrm>
+          <a:off x="0" y="0"/>
+          <a:ext cx="0" cy="0"/>
+          <a:chOff x="0" y="0"/>
+          <a:chExt cx="0" cy="0"/>
+        </a:xfrm>
+      </p:grpSpPr>
+      <p:sp>
+        <p:nvSpPr>
+          <p:cNvPr id="2" name="Slide Image Placeholder 1"/>
+          <p:cNvSpPr>
+            <a:spLocks noGrp="1" noRot="1" noChangeAspect="1"/>
+          </p:cNvSpPr>
+          <p:nvPr>
+            <p:ph type="sldImg"/>
+          </p:nvPr>
+        </p:nvSpPr>
+        <p:spPr/>
+      </p:sp>
+      <p:sp>
+        <p:nvSpPr>
+          <p:cNvPr id="3" name="Notes Placeholder 2"/>
+          <p:cNvSpPr>
+            <a:spLocks noGrp="1"/>
+          </p:cNvSpPr>
+          <p:nvPr>
+            <p:ph type="body" idx="1"/>
+          </p:nvPr>
+        </p:nvSpPr>
+        <p:spPr/>
+        <p:txBody>
+          <a:bodyPr>
+            <a:normAutofit/>
+          </a:bodyPr>
+          <a:lstStyle/>
+          <a:p>
+            <a:endParaRPr lang="en-IN"/>
+          </a:p>
+        </p:txBody>
+      </p:sp>
+      <p:sp>
+        <p:nvSpPr>
+          <p:cNvPr id="4" name="Slide Number Placeholder 3"/>
+          <p:cNvSpPr>
+            <a:spLocks noGrp="1"/>
+          </p:cNvSpPr>
+          <p:nvPr>
+            <p:ph type="sldNum" sz="quarter" idx="10"/>
+          </p:nvPr>
+        </p:nvSpPr>
+        <p:spPr/>
+        <p:txBody>
+          <a:bodyPr/>
+          <a:lstStyle/>
+          <a:p>
+            <a:fld id="{1A4945FF-0009-4457-926B-F5E54299CBA9}" type="slidenum">
+              <a:rPr lang="en-IN" smtClean="0"/>
+              <a:pPr/>
+              <a:t>27</a:t>
             </a:fld>
             <a:endParaRPr lang="en-IN"/>
           </a:p>
@@ -9931,7 +10014,7 @@
             <a:fld id="{97221767-25D4-4AB0-9019-C5AC0B550514}" type="datetime1">
               <a:rPr lang="en-US" smtClean="0"/>
               <a:pPr/>
-              <a:t>28/01/13</a:t>
+              <a:t>1/29/2013</a:t>
             </a:fld>
             <a:endParaRPr lang="en-US"/>
           </a:p>
@@ -10102,7 +10185,7 @@
             <a:fld id="{BEE64468-379F-47B7-A066-BA01D1CB4174}" type="datetime1">
               <a:rPr lang="en-US" smtClean="0"/>
               <a:pPr/>
-              <a:t>28/01/13</a:t>
+              <a:t>1/29/2013</a:t>
             </a:fld>
             <a:endParaRPr lang="en-US"/>
           </a:p>
@@ -10283,7 +10366,7 @@
             <a:fld id="{113B6A1A-58C3-4ED4-9E5E-F86177356E98}" type="datetime1">
               <a:rPr lang="en-US" smtClean="0"/>
               <a:pPr/>
-              <a:t>28/01/13</a:t>
+              <a:t>1/29/2013</a:t>
             </a:fld>
             <a:endParaRPr lang="en-US"/>
           </a:p>
@@ -10454,7 +10537,7 @@
             <a:fld id="{5E6AF81B-A918-46DE-84D0-43BBB0A04F80}" type="datetime1">
               <a:rPr lang="en-US" smtClean="0"/>
               <a:pPr/>
-              <a:t>28/01/13</a:t>
+              <a:t>1/29/2013</a:t>
             </a:fld>
             <a:endParaRPr lang="en-US"/>
           </a:p>
@@ -10701,7 +10784,7 @@
             <a:fld id="{81B2C663-BEDA-4AD4-8C06-934BBF701592}" type="datetime1">
               <a:rPr lang="en-US" smtClean="0"/>
               <a:pPr/>
-              <a:t>28/01/13</a:t>
+              <a:t>1/29/2013</a:t>
             </a:fld>
             <a:endParaRPr lang="en-US"/>
           </a:p>
@@ -10990,7 +11073,7 @@
             <a:fld id="{3C2C3FB5-3EBF-45FD-AC30-0ECF05DA35F1}" type="datetime1">
               <a:rPr lang="en-US" smtClean="0"/>
               <a:pPr/>
-              <a:t>28/01/13</a:t>
+              <a:t>1/29/2013</a:t>
             </a:fld>
             <a:endParaRPr lang="en-US"/>
           </a:p>
@@ -11413,7 +11496,7 @@
             <a:fld id="{5E883BF8-6085-4032-804D-13579CFA1241}" type="datetime1">
               <a:rPr lang="en-US" smtClean="0"/>
               <a:pPr/>
-              <a:t>28/01/13</a:t>
+              <a:t>1/29/2013</a:t>
             </a:fld>
             <a:endParaRPr lang="en-US"/>
           </a:p>
@@ -11532,7 +11615,7 @@
             <a:fld id="{9FBD7AC8-42FA-4F1B-9113-F260AA003A93}" type="datetime1">
               <a:rPr lang="en-US" smtClean="0"/>
               <a:pPr/>
-              <a:t>28/01/13</a:t>
+              <a:t>1/29/2013</a:t>
             </a:fld>
             <a:endParaRPr lang="en-US"/>
           </a:p>
@@ -11628,7 +11711,7 @@
             <a:fld id="{746C5187-D186-404D-BC99-E110F34B1247}" type="datetime1">
               <a:rPr lang="en-US" smtClean="0"/>
               <a:pPr/>
-              <a:t>28/01/13</a:t>
+              <a:t>1/29/2013</a:t>
             </a:fld>
             <a:endParaRPr lang="en-US"/>
           </a:p>
@@ -11906,7 +11989,7 @@
             <a:fld id="{6C2C0CB9-BC4F-4279-891A-E4B69C62B82E}" type="datetime1">
               <a:rPr lang="en-US" smtClean="0"/>
               <a:pPr/>
-              <a:t>28/01/13</a:t>
+              <a:t>1/29/2013</a:t>
             </a:fld>
             <a:endParaRPr lang="en-US"/>
           </a:p>
@@ -12160,7 +12243,7 @@
             <a:fld id="{E7FC0189-F934-4828-93E1-35ED2A8E2B98}" type="datetime1">
               <a:rPr lang="en-US" smtClean="0"/>
               <a:pPr/>
-              <a:t>28/01/13</a:t>
+              <a:t>1/29/2013</a:t>
             </a:fld>
             <a:endParaRPr lang="en-US"/>
           </a:p>
@@ -12374,7 +12457,7 @@
             <a:fld id="{BD5A7964-00C7-493B-B4DE-5BC17E3F56B6}" type="datetime1">
               <a:rPr lang="en-US" smtClean="0"/>
               <a:pPr/>
-              <a:t>28/01/13</a:t>
+              <a:t>1/29/2013</a:t>
             </a:fld>
             <a:endParaRPr lang="en-US"/>
           </a:p>
@@ -12875,7 +12958,7 @@
   <p:timing>
     <p:tnLst>
       <p:par>
-        <p:cTn xmlns:p14="http://schemas.microsoft.com/office/powerpoint/2010/main" id="1" dur="indefinite" restart="never" nodeType="tmRoot"/>
+        <p:cTn id="1" dur="indefinite" restart="never" nodeType="tmRoot"/>
       </p:par>
     </p:tnLst>
   </p:timing>
@@ -13243,10 +13326,34 @@
           </a:p>
         </p:txBody>
       </p:sp>
+      <p:pic>
+        <p:nvPicPr>
+          <p:cNvPr id="8" name="Picture 7" descr="stl_logo.gif"/>
+          <p:cNvPicPr>
+            <a:picLocks noChangeAspect="1"/>
+          </p:cNvPicPr>
+          <p:nvPr/>
+        </p:nvPicPr>
+        <p:blipFill>
+          <a:blip r:embed="rId3" cstate="print"/>
+          <a:stretch>
+            <a:fillRect/>
+          </a:stretch>
+        </p:blipFill>
+        <p:spPr>
+          <a:xfrm>
+            <a:off x="228600" y="6096000"/>
+            <a:ext cx="1352550" cy="590550"/>
+          </a:xfrm>
+          <a:prstGeom prst="rect">
+            <a:avLst/>
+          </a:prstGeom>
+        </p:spPr>
+      </p:pic>
     </p:spTree>
     <p:extLst>
       <p:ext uri="{BB962C8B-B14F-4D97-AF65-F5344CB8AC3E}">
-        <p14:creationId xmlns:p14="http://schemas.microsoft.com/office/powerpoint/2010/main" val="911566382"/>
+        <p14:creationId xmlns:p14="http://schemas.microsoft.com/office/powerpoint/2010/main" xmlns="" val="911566382"/>
       </p:ext>
     </p:extLst>
   </p:cSld>
@@ -13256,7 +13363,7 @@
   <p:timing>
     <p:tnLst>
       <p:par>
-        <p:cTn xmlns:p14="http://schemas.microsoft.com/office/powerpoint/2010/main" id="1" dur="indefinite" restart="never" nodeType="tmRoot"/>
+        <p:cTn id="1" dur="indefinite" restart="never" nodeType="tmRoot"/>
       </p:par>
     </p:tnLst>
   </p:timing>
@@ -13567,10 +13674,34 @@
           </a:p>
         </p:txBody>
       </p:sp>
+      <p:pic>
+        <p:nvPicPr>
+          <p:cNvPr id="7" name="Picture 6" descr="stl_logo.gif"/>
+          <p:cNvPicPr>
+            <a:picLocks noChangeAspect="1"/>
+          </p:cNvPicPr>
+          <p:nvPr/>
+        </p:nvPicPr>
+        <p:blipFill>
+          <a:blip r:embed="rId3" cstate="print"/>
+          <a:stretch>
+            <a:fillRect/>
+          </a:stretch>
+        </p:blipFill>
+        <p:spPr>
+          <a:xfrm>
+            <a:off x="228600" y="6096000"/>
+            <a:ext cx="1352550" cy="590550"/>
+          </a:xfrm>
+          <a:prstGeom prst="rect">
+            <a:avLst/>
+          </a:prstGeom>
+        </p:spPr>
+      </p:pic>
     </p:spTree>
     <p:extLst>
       <p:ext uri="{BB962C8B-B14F-4D97-AF65-F5344CB8AC3E}">
-        <p14:creationId xmlns:p14="http://schemas.microsoft.com/office/powerpoint/2010/main" val="911566382"/>
+        <p14:creationId xmlns:p14="http://schemas.microsoft.com/office/powerpoint/2010/main" xmlns="" val="911566382"/>
       </p:ext>
     </p:extLst>
   </p:cSld>
@@ -13580,7 +13711,7 @@
   <p:timing>
     <p:tnLst>
       <p:par>
-        <p:cTn xmlns:p14="http://schemas.microsoft.com/office/powerpoint/2010/main" id="1" dur="indefinite" restart="never" nodeType="tmRoot"/>
+        <p:cTn id="1" dur="indefinite" restart="never" nodeType="tmRoot"/>
       </p:par>
     </p:tnLst>
   </p:timing>
@@ -14005,10 +14136,34 @@
           </a:p>
         </p:txBody>
       </p:sp>
+      <p:pic>
+        <p:nvPicPr>
+          <p:cNvPr id="9" name="Picture 8" descr="stl_logo.gif"/>
+          <p:cNvPicPr>
+            <a:picLocks noChangeAspect="1"/>
+          </p:cNvPicPr>
+          <p:nvPr/>
+        </p:nvPicPr>
+        <p:blipFill>
+          <a:blip r:embed="rId3" cstate="print"/>
+          <a:stretch>
+            <a:fillRect/>
+          </a:stretch>
+        </p:blipFill>
+        <p:spPr>
+          <a:xfrm>
+            <a:off x="228600" y="6096000"/>
+            <a:ext cx="1352550" cy="590550"/>
+          </a:xfrm>
+          <a:prstGeom prst="rect">
+            <a:avLst/>
+          </a:prstGeom>
+        </p:spPr>
+      </p:pic>
     </p:spTree>
     <p:extLst>
       <p:ext uri="{BB962C8B-B14F-4D97-AF65-F5344CB8AC3E}">
-        <p14:creationId xmlns:p14="http://schemas.microsoft.com/office/powerpoint/2010/main" val="911566382"/>
+        <p14:creationId xmlns:p14="http://schemas.microsoft.com/office/powerpoint/2010/main" xmlns="" val="911566382"/>
       </p:ext>
     </p:extLst>
   </p:cSld>
@@ -14018,7 +14173,7 @@
   <p:timing>
     <p:tnLst>
       <p:par>
-        <p:cTn xmlns:p14="http://schemas.microsoft.com/office/powerpoint/2010/main" id="1" dur="indefinite" restart="never" nodeType="tmRoot"/>
+        <p:cTn id="1" dur="indefinite" restart="never" nodeType="tmRoot"/>
       </p:par>
     </p:tnLst>
   </p:timing>
@@ -14298,7 +14453,7 @@
     </p:spTree>
     <p:extLst>
       <p:ext uri="{BB962C8B-B14F-4D97-AF65-F5344CB8AC3E}">
-        <p14:creationId xmlns:p14="http://schemas.microsoft.com/office/powerpoint/2010/main" val="1274243446"/>
+        <p14:creationId xmlns:p14="http://schemas.microsoft.com/office/powerpoint/2010/main" xmlns="" val="1274243446"/>
       </p:ext>
     </p:extLst>
   </p:cSld>
@@ -14308,7 +14463,7 @@
   <p:timing>
     <p:tnLst>
       <p:par>
-        <p:cTn xmlns:p14="http://schemas.microsoft.com/office/powerpoint/2010/main" id="1" dur="indefinite" restart="never" nodeType="tmRoot"/>
+        <p:cTn id="1" dur="indefinite" restart="never" nodeType="tmRoot"/>
       </p:par>
     </p:tnLst>
   </p:timing>
@@ -14619,10 +14774,34 @@
           </a:p>
         </p:txBody>
       </p:sp>
+      <p:pic>
+        <p:nvPicPr>
+          <p:cNvPr id="7" name="Picture 6" descr="stl_logo.gif"/>
+          <p:cNvPicPr>
+            <a:picLocks noChangeAspect="1"/>
+          </p:cNvPicPr>
+          <p:nvPr/>
+        </p:nvPicPr>
+        <p:blipFill>
+          <a:blip r:embed="rId3" cstate="print"/>
+          <a:stretch>
+            <a:fillRect/>
+          </a:stretch>
+        </p:blipFill>
+        <p:spPr>
+          <a:xfrm>
+            <a:off x="228600" y="6096000"/>
+            <a:ext cx="1352550" cy="590550"/>
+          </a:xfrm>
+          <a:prstGeom prst="rect">
+            <a:avLst/>
+          </a:prstGeom>
+        </p:spPr>
+      </p:pic>
     </p:spTree>
     <p:extLst>
       <p:ext uri="{BB962C8B-B14F-4D97-AF65-F5344CB8AC3E}">
-        <p14:creationId xmlns:p14="http://schemas.microsoft.com/office/powerpoint/2010/main" val="911566382"/>
+        <p14:creationId xmlns:p14="http://schemas.microsoft.com/office/powerpoint/2010/main" xmlns="" val="911566382"/>
       </p:ext>
     </p:extLst>
   </p:cSld>
@@ -14632,7 +14811,7 @@
   <p:timing>
     <p:tnLst>
       <p:par>
-        <p:cTn xmlns:p14="http://schemas.microsoft.com/office/powerpoint/2010/main" id="1" dur="indefinite" restart="never" nodeType="tmRoot"/>
+        <p:cTn id="1" dur="indefinite" restart="never" nodeType="tmRoot"/>
       </p:par>
     </p:tnLst>
   </p:timing>
@@ -15000,10 +15179,34 @@
           </a:p>
         </p:txBody>
       </p:sp>
+      <p:pic>
+        <p:nvPicPr>
+          <p:cNvPr id="8" name="Picture 7" descr="stl_logo.gif"/>
+          <p:cNvPicPr>
+            <a:picLocks noChangeAspect="1"/>
+          </p:cNvPicPr>
+          <p:nvPr/>
+        </p:nvPicPr>
+        <p:blipFill>
+          <a:blip r:embed="rId3" cstate="print"/>
+          <a:stretch>
+            <a:fillRect/>
+          </a:stretch>
+        </p:blipFill>
+        <p:spPr>
+          <a:xfrm>
+            <a:off x="228600" y="6096000"/>
+            <a:ext cx="1352550" cy="590550"/>
+          </a:xfrm>
+          <a:prstGeom prst="rect">
+            <a:avLst/>
+          </a:prstGeom>
+        </p:spPr>
+      </p:pic>
     </p:spTree>
     <p:extLst>
       <p:ext uri="{BB962C8B-B14F-4D97-AF65-F5344CB8AC3E}">
-        <p14:creationId xmlns:p14="http://schemas.microsoft.com/office/powerpoint/2010/main" val="911566382"/>
+        <p14:creationId xmlns:p14="http://schemas.microsoft.com/office/powerpoint/2010/main" xmlns="" val="911566382"/>
       </p:ext>
     </p:extLst>
   </p:cSld>
@@ -15013,7 +15216,7 @@
   <p:timing>
     <p:tnLst>
       <p:par>
-        <p:cTn xmlns:p14="http://schemas.microsoft.com/office/powerpoint/2010/main" id="1" dur="indefinite" restart="never" nodeType="tmRoot"/>
+        <p:cTn id="1" dur="indefinite" restart="never" nodeType="tmRoot"/>
       </p:par>
     </p:tnLst>
   </p:timing>
@@ -15317,20 +15520,12 @@
               <a:t>Shown here are the curves of life expectancy for all countries in </a:t>
             </a:r>
             <a:r>
-              <a:rPr lang="en-US" sz="1200" dirty="0" err="1" smtClean="0">
-                <a:solidFill>
-                  <a:schemeClr val="tx1"/>
-                </a:solidFill>
-              </a:rPr>
-              <a:t>europe</a:t>
-            </a:r>
-            <a:r>
               <a:rPr lang="en-US" sz="1200" dirty="0" smtClean="0">
                 <a:solidFill>
                   <a:schemeClr val="tx1"/>
                 </a:solidFill>
               </a:rPr>
-              <a:t> </a:t>
+              <a:t>Europe </a:t>
             </a:r>
             <a:endParaRPr lang="en-US" sz="1200" dirty="0">
               <a:solidFill>
@@ -15340,10 +15535,34 @@
           </a:p>
         </p:txBody>
       </p:sp>
+      <p:pic>
+        <p:nvPicPr>
+          <p:cNvPr id="7" name="Picture 6" descr="stl_logo.gif"/>
+          <p:cNvPicPr>
+            <a:picLocks noChangeAspect="1"/>
+          </p:cNvPicPr>
+          <p:nvPr/>
+        </p:nvPicPr>
+        <p:blipFill>
+          <a:blip r:embed="rId3" cstate="print"/>
+          <a:stretch>
+            <a:fillRect/>
+          </a:stretch>
+        </p:blipFill>
+        <p:spPr>
+          <a:xfrm>
+            <a:off x="228600" y="6096000"/>
+            <a:ext cx="1352550" cy="590550"/>
+          </a:xfrm>
+          <a:prstGeom prst="rect">
+            <a:avLst/>
+          </a:prstGeom>
+        </p:spPr>
+      </p:pic>
     </p:spTree>
     <p:extLst>
       <p:ext uri="{BB962C8B-B14F-4D97-AF65-F5344CB8AC3E}">
-        <p14:creationId xmlns:p14="http://schemas.microsoft.com/office/powerpoint/2010/main" val="911566382"/>
+        <p14:creationId xmlns:p14="http://schemas.microsoft.com/office/powerpoint/2010/main" xmlns="" val="911566382"/>
       </p:ext>
     </p:extLst>
   </p:cSld>
@@ -15353,7 +15572,7 @@
   <p:timing>
     <p:tnLst>
       <p:par>
-        <p:cTn xmlns:p14="http://schemas.microsoft.com/office/powerpoint/2010/main" id="1" dur="indefinite" restart="never" nodeType="tmRoot"/>
+        <p:cTn id="1" dur="indefinite" restart="never" nodeType="tmRoot"/>
       </p:par>
     </p:tnLst>
   </p:timing>
@@ -15664,10 +15883,34 @@
           </a:p>
         </p:txBody>
       </p:sp>
+      <p:pic>
+        <p:nvPicPr>
+          <p:cNvPr id="7" name="Picture 6" descr="stl_logo.gif"/>
+          <p:cNvPicPr>
+            <a:picLocks noChangeAspect="1"/>
+          </p:cNvPicPr>
+          <p:nvPr/>
+        </p:nvPicPr>
+        <p:blipFill>
+          <a:blip r:embed="rId3" cstate="print"/>
+          <a:stretch>
+            <a:fillRect/>
+          </a:stretch>
+        </p:blipFill>
+        <p:spPr>
+          <a:xfrm>
+            <a:off x="228600" y="6096000"/>
+            <a:ext cx="1352550" cy="590550"/>
+          </a:xfrm>
+          <a:prstGeom prst="rect">
+            <a:avLst/>
+          </a:prstGeom>
+        </p:spPr>
+      </p:pic>
     </p:spTree>
     <p:extLst>
       <p:ext uri="{BB962C8B-B14F-4D97-AF65-F5344CB8AC3E}">
-        <p14:creationId xmlns:p14="http://schemas.microsoft.com/office/powerpoint/2010/main" val="911566382"/>
+        <p14:creationId xmlns:p14="http://schemas.microsoft.com/office/powerpoint/2010/main" xmlns="" val="911566382"/>
       </p:ext>
     </p:extLst>
   </p:cSld>
@@ -15677,7 +15920,7 @@
   <p:timing>
     <p:tnLst>
       <p:par>
-        <p:cTn xmlns:p14="http://schemas.microsoft.com/office/powerpoint/2010/main" id="1" dur="indefinite" restart="never" nodeType="tmRoot"/>
+        <p:cTn id="1" dur="indefinite" restart="never" nodeType="tmRoot"/>
       </p:par>
     </p:tnLst>
   </p:timing>
@@ -15988,10 +16231,34 @@
           </a:p>
         </p:txBody>
       </p:sp>
+      <p:pic>
+        <p:nvPicPr>
+          <p:cNvPr id="7" name="Picture 6" descr="stl_logo.gif"/>
+          <p:cNvPicPr>
+            <a:picLocks noChangeAspect="1"/>
+          </p:cNvPicPr>
+          <p:nvPr/>
+        </p:nvPicPr>
+        <p:blipFill>
+          <a:blip r:embed="rId3" cstate="print"/>
+          <a:stretch>
+            <a:fillRect/>
+          </a:stretch>
+        </p:blipFill>
+        <p:spPr>
+          <a:xfrm>
+            <a:off x="228600" y="6096000"/>
+            <a:ext cx="1352550" cy="590550"/>
+          </a:xfrm>
+          <a:prstGeom prst="rect">
+            <a:avLst/>
+          </a:prstGeom>
+        </p:spPr>
+      </p:pic>
     </p:spTree>
     <p:extLst>
       <p:ext uri="{BB962C8B-B14F-4D97-AF65-F5344CB8AC3E}">
-        <p14:creationId xmlns:p14="http://schemas.microsoft.com/office/powerpoint/2010/main" val="911566382"/>
+        <p14:creationId xmlns:p14="http://schemas.microsoft.com/office/powerpoint/2010/main" xmlns="" val="911566382"/>
       </p:ext>
     </p:extLst>
   </p:cSld>
@@ -16001,7 +16268,7 @@
   <p:timing>
     <p:tnLst>
       <p:par>
-        <p:cTn xmlns:p14="http://schemas.microsoft.com/office/powerpoint/2010/main" id="1" dur="indefinite" restart="never" nodeType="tmRoot"/>
+        <p:cTn id="1" dur="indefinite" restart="never" nodeType="tmRoot"/>
       </p:par>
     </p:tnLst>
   </p:timing>
@@ -16312,10 +16579,34 @@
           </a:p>
         </p:txBody>
       </p:sp>
+      <p:pic>
+        <p:nvPicPr>
+          <p:cNvPr id="7" name="Picture 6" descr="stl_logo.gif"/>
+          <p:cNvPicPr>
+            <a:picLocks noChangeAspect="1"/>
+          </p:cNvPicPr>
+          <p:nvPr/>
+        </p:nvPicPr>
+        <p:blipFill>
+          <a:blip r:embed="rId3" cstate="print"/>
+          <a:stretch>
+            <a:fillRect/>
+          </a:stretch>
+        </p:blipFill>
+        <p:spPr>
+          <a:xfrm>
+            <a:off x="228600" y="6096000"/>
+            <a:ext cx="1352550" cy="590550"/>
+          </a:xfrm>
+          <a:prstGeom prst="rect">
+            <a:avLst/>
+          </a:prstGeom>
+        </p:spPr>
+      </p:pic>
     </p:spTree>
     <p:extLst>
       <p:ext uri="{BB962C8B-B14F-4D97-AF65-F5344CB8AC3E}">
-        <p14:creationId xmlns:p14="http://schemas.microsoft.com/office/powerpoint/2010/main" val="911566382"/>
+        <p14:creationId xmlns:p14="http://schemas.microsoft.com/office/powerpoint/2010/main" xmlns="" val="911566382"/>
       </p:ext>
     </p:extLst>
   </p:cSld>
@@ -16325,7 +16616,7 @@
   <p:timing>
     <p:tnLst>
       <p:par>
-        <p:cTn xmlns:p14="http://schemas.microsoft.com/office/powerpoint/2010/main" id="1" dur="indefinite" restart="never" nodeType="tmRoot"/>
+        <p:cTn id="1" dur="indefinite" restart="never" nodeType="tmRoot"/>
       </p:par>
     </p:tnLst>
   </p:timing>
@@ -16793,10 +17084,34 @@
           </a:p>
         </p:txBody>
       </p:sp>
+      <p:pic>
+        <p:nvPicPr>
+          <p:cNvPr id="14" name="Picture 13" descr="stl_logo.gif"/>
+          <p:cNvPicPr>
+            <a:picLocks noChangeAspect="1"/>
+          </p:cNvPicPr>
+          <p:nvPr/>
+        </p:nvPicPr>
+        <p:blipFill>
+          <a:blip r:embed="rId2" cstate="print"/>
+          <a:stretch>
+            <a:fillRect/>
+          </a:stretch>
+        </p:blipFill>
+        <p:spPr>
+          <a:xfrm>
+            <a:off x="228600" y="6096000"/>
+            <a:ext cx="1352550" cy="590550"/>
+          </a:xfrm>
+          <a:prstGeom prst="rect">
+            <a:avLst/>
+          </a:prstGeom>
+        </p:spPr>
+      </p:pic>
     </p:spTree>
     <p:extLst>
       <p:ext uri="{BB962C8B-B14F-4D97-AF65-F5344CB8AC3E}">
-        <p14:creationId xmlns:p14="http://schemas.microsoft.com/office/powerpoint/2010/main" val="911566382"/>
+        <p14:creationId xmlns:p14="http://schemas.microsoft.com/office/powerpoint/2010/main" xmlns="" val="911566382"/>
       </p:ext>
     </p:extLst>
   </p:cSld>
@@ -16806,7 +17121,7 @@
   <p:timing>
     <p:tnLst>
       <p:par>
-        <p:cTn xmlns:p14="http://schemas.microsoft.com/office/powerpoint/2010/main" id="1" dur="indefinite" restart="never" nodeType="tmRoot"/>
+        <p:cTn id="1" dur="indefinite" restart="never" nodeType="tmRoot"/>
       </p:par>
     </p:tnLst>
   </p:timing>
@@ -17117,10 +17432,34 @@
           </a:p>
         </p:txBody>
       </p:sp>
+      <p:pic>
+        <p:nvPicPr>
+          <p:cNvPr id="7" name="Picture 6" descr="stl_logo.gif"/>
+          <p:cNvPicPr>
+            <a:picLocks noChangeAspect="1"/>
+          </p:cNvPicPr>
+          <p:nvPr/>
+        </p:nvPicPr>
+        <p:blipFill>
+          <a:blip r:embed="rId4" cstate="print"/>
+          <a:stretch>
+            <a:fillRect/>
+          </a:stretch>
+        </p:blipFill>
+        <p:spPr>
+          <a:xfrm>
+            <a:off x="228600" y="6096000"/>
+            <a:ext cx="1352550" cy="590550"/>
+          </a:xfrm>
+          <a:prstGeom prst="rect">
+            <a:avLst/>
+          </a:prstGeom>
+        </p:spPr>
+      </p:pic>
     </p:spTree>
     <p:extLst>
       <p:ext uri="{BB962C8B-B14F-4D97-AF65-F5344CB8AC3E}">
-        <p14:creationId xmlns:p14="http://schemas.microsoft.com/office/powerpoint/2010/main" val="911566382"/>
+        <p14:creationId xmlns:p14="http://schemas.microsoft.com/office/powerpoint/2010/main" xmlns="" val="911566382"/>
       </p:ext>
     </p:extLst>
   </p:cSld>
@@ -17130,7 +17469,7 @@
   <p:timing>
     <p:tnLst>
       <p:par>
-        <p:cTn xmlns:p14="http://schemas.microsoft.com/office/powerpoint/2010/main" id="1" dur="indefinite" restart="never" nodeType="tmRoot"/>
+        <p:cTn id="1" dur="indefinite" restart="never" nodeType="tmRoot"/>
       </p:par>
     </p:tnLst>
   </p:timing>
@@ -17410,7 +17749,7 @@
     </p:spTree>
     <p:extLst>
       <p:ext uri="{BB962C8B-B14F-4D97-AF65-F5344CB8AC3E}">
-        <p14:creationId xmlns:p14="http://schemas.microsoft.com/office/powerpoint/2010/main" val="4240999059"/>
+        <p14:creationId xmlns:p14="http://schemas.microsoft.com/office/powerpoint/2010/main" xmlns="" val="4240999059"/>
       </p:ext>
     </p:extLst>
   </p:cSld>
@@ -17420,7 +17759,7 @@
   <p:timing>
     <p:tnLst>
       <p:par>
-        <p:cTn xmlns:p14="http://schemas.microsoft.com/office/powerpoint/2010/main" id="1" dur="indefinite" restart="never" nodeType="tmRoot"/>
+        <p:cTn id="1" dur="indefinite" restart="never" nodeType="tmRoot"/>
       </p:par>
     </p:tnLst>
   </p:timing>
@@ -17651,10 +17990,10 @@
           <p:nvPr/>
         </p:nvPicPr>
         <p:blipFill>
-          <a:blip r:embed="rId2">
+          <a:blip r:embed="rId2" cstate="print">
             <a:extLst>
               <a:ext uri="{28A0092B-C50C-407E-A947-70E740481C1C}">
-                <a14:useLocalDpi xmlns:a14="http://schemas.microsoft.com/office/drawing/2010/main" val="0"/>
+                <a14:useLocalDpi xmlns:a14="http://schemas.microsoft.com/office/drawing/2010/main" xmlns="" val="0"/>
               </a:ext>
             </a:extLst>
           </a:blip>
@@ -17729,10 +18068,34 @@
           </a:p>
         </p:txBody>
       </p:sp>
+      <p:pic>
+        <p:nvPicPr>
+          <p:cNvPr id="7" name="Picture 6" descr="stl_logo.gif"/>
+          <p:cNvPicPr>
+            <a:picLocks noChangeAspect="1"/>
+          </p:cNvPicPr>
+          <p:nvPr/>
+        </p:nvPicPr>
+        <p:blipFill>
+          <a:blip r:embed="rId3" cstate="print"/>
+          <a:stretch>
+            <a:fillRect/>
+          </a:stretch>
+        </p:blipFill>
+        <p:spPr>
+          <a:xfrm>
+            <a:off x="228600" y="6096000"/>
+            <a:ext cx="1352550" cy="590550"/>
+          </a:xfrm>
+          <a:prstGeom prst="rect">
+            <a:avLst/>
+          </a:prstGeom>
+        </p:spPr>
+      </p:pic>
     </p:spTree>
     <p:extLst>
       <p:ext uri="{BB962C8B-B14F-4D97-AF65-F5344CB8AC3E}">
-        <p14:creationId xmlns:p14="http://schemas.microsoft.com/office/powerpoint/2010/main" val="911566382"/>
+        <p14:creationId xmlns:p14="http://schemas.microsoft.com/office/powerpoint/2010/main" xmlns="" val="911566382"/>
       </p:ext>
     </p:extLst>
   </p:cSld>
@@ -17742,7 +18105,7 @@
   <p:timing>
     <p:tnLst>
       <p:par>
-        <p:cTn xmlns:p14="http://schemas.microsoft.com/office/powerpoint/2010/main" id="1" dur="indefinite" restart="never" nodeType="tmRoot"/>
+        <p:cTn id="1" dur="indefinite" restart="never" nodeType="tmRoot"/>
       </p:par>
     </p:tnLst>
   </p:timing>
@@ -17973,10 +18336,10 @@
           <p:nvPr/>
         </p:nvPicPr>
         <p:blipFill>
-          <a:blip r:embed="rId2">
+          <a:blip r:embed="rId2" cstate="print">
             <a:extLst>
               <a:ext uri="{28A0092B-C50C-407E-A947-70E740481C1C}">
-                <a14:useLocalDpi xmlns:a14="http://schemas.microsoft.com/office/drawing/2010/main" val="0"/>
+                <a14:useLocalDpi xmlns:a14="http://schemas.microsoft.com/office/drawing/2010/main" xmlns="" val="0"/>
               </a:ext>
             </a:extLst>
           </a:blip>
@@ -18108,10 +18471,34 @@
           </a:p>
         </p:txBody>
       </p:sp>
+      <p:pic>
+        <p:nvPicPr>
+          <p:cNvPr id="8" name="Picture 7" descr="stl_logo.gif"/>
+          <p:cNvPicPr>
+            <a:picLocks noChangeAspect="1"/>
+          </p:cNvPicPr>
+          <p:nvPr/>
+        </p:nvPicPr>
+        <p:blipFill>
+          <a:blip r:embed="rId3" cstate="print"/>
+          <a:stretch>
+            <a:fillRect/>
+          </a:stretch>
+        </p:blipFill>
+        <p:spPr>
+          <a:xfrm>
+            <a:off x="228600" y="6096000"/>
+            <a:ext cx="1352550" cy="590550"/>
+          </a:xfrm>
+          <a:prstGeom prst="rect">
+            <a:avLst/>
+          </a:prstGeom>
+        </p:spPr>
+      </p:pic>
     </p:spTree>
     <p:extLst>
       <p:ext uri="{BB962C8B-B14F-4D97-AF65-F5344CB8AC3E}">
-        <p14:creationId xmlns:p14="http://schemas.microsoft.com/office/powerpoint/2010/main" val="911566382"/>
+        <p14:creationId xmlns:p14="http://schemas.microsoft.com/office/powerpoint/2010/main" xmlns="" val="911566382"/>
       </p:ext>
     </p:extLst>
   </p:cSld>
@@ -18121,7 +18508,7 @@
   <p:timing>
     <p:tnLst>
       <p:par>
-        <p:cTn xmlns:p14="http://schemas.microsoft.com/office/powerpoint/2010/main" id="1" dur="indefinite" restart="never" nodeType="tmRoot"/>
+        <p:cTn id="1" dur="indefinite" restart="never" nodeType="tmRoot"/>
       </p:par>
     </p:tnLst>
   </p:timing>
@@ -18306,24 +18693,7 @@
                   </a:outerShdw>
                 </a:effectLst>
               </a:rPr>
-              <a:t>BMBI </a:t>
-            </a:r>
-            <a:r>
-              <a:rPr lang="en-US" sz="3600" dirty="0" smtClean="0">
-                <a:solidFill>
-                  <a:schemeClr val="bg1">
-                    <a:lumMod val="75000"/>
-                  </a:schemeClr>
-                </a:solidFill>
-                <a:effectLst>
-                  <a:outerShdw blurRad="38100" dist="38100" dir="2700000" algn="tl">
-                    <a:srgbClr val="000000">
-                      <a:alpha val="43137"/>
-                    </a:srgbClr>
-                  </a:outerShdw>
-                </a:effectLst>
-              </a:rPr>
-              <a:t>Technology Stack</a:t>
+              <a:t>BMBI Technology Stack</a:t>
             </a:r>
             <a:endParaRPr lang="en-IN" sz="3600" dirty="0">
               <a:solidFill>
@@ -18350,7 +18720,7 @@
           <p:nvPr>
             <p:extLst>
               <p:ext uri="{D42A27DB-BD31-4B8C-83A1-F6EECF244321}">
-                <p14:modId xmlns:p14="http://schemas.microsoft.com/office/powerpoint/2010/main" val="3258275215"/>
+                <p14:modId xmlns:p14="http://schemas.microsoft.com/office/powerpoint/2010/main" xmlns="" val="3258275215"/>
               </p:ext>
             </p:extLst>
           </p:nvPr>
@@ -18372,7 +18742,7 @@
           <p:nvPr>
             <p:extLst>
               <p:ext uri="{D42A27DB-BD31-4B8C-83A1-F6EECF244321}">
-                <p14:modId xmlns:p14="http://schemas.microsoft.com/office/powerpoint/2010/main" val="3258275215"/>
+                <p14:modId xmlns:p14="http://schemas.microsoft.com/office/powerpoint/2010/main" xmlns="" val="3258275215"/>
               </p:ext>
             </p:extLst>
           </p:nvPr>
@@ -19270,14 +19640,13 @@
               <a:rPr lang="en-US" sz="1400" dirty="0" smtClean="0"/>
               <a:t>Oracle</a:t>
             </a:r>
-            <a:endParaRPr lang="en-US" sz="1400" dirty="0" smtClean="0"/>
           </a:p>
         </p:txBody>
       </p:sp>
     </p:spTree>
     <p:extLst>
       <p:ext uri="{BB962C8B-B14F-4D97-AF65-F5344CB8AC3E}">
-        <p14:creationId xmlns:p14="http://schemas.microsoft.com/office/powerpoint/2010/main" val="3738085461"/>
+        <p14:creationId xmlns:p14="http://schemas.microsoft.com/office/powerpoint/2010/main" xmlns="" val="3738085461"/>
       </p:ext>
     </p:extLst>
   </p:cSld>
@@ -19287,7 +19656,7 @@
   <p:timing>
     <p:tnLst>
       <p:par>
-        <p:cTn xmlns:p14="http://schemas.microsoft.com/office/powerpoint/2010/main" id="1" dur="indefinite" restart="never" nodeType="tmRoot"/>
+        <p:cTn id="1" dur="indefinite" restart="never" nodeType="tmRoot"/>
       </p:par>
     </p:tnLst>
   </p:timing>
@@ -19572,7 +19941,7 @@
           <p:nvPr>
             <p:extLst>
               <p:ext uri="{D42A27DB-BD31-4B8C-83A1-F6EECF244321}">
-                <p14:modId xmlns:p14="http://schemas.microsoft.com/office/powerpoint/2010/main" val="588603736"/>
+                <p14:modId xmlns:p14="http://schemas.microsoft.com/office/powerpoint/2010/main" xmlns="" val="588603736"/>
               </p:ext>
             </p:extLst>
           </p:nvPr>
@@ -20265,7 +20634,7 @@
     </p:spTree>
     <p:extLst>
       <p:ext uri="{BB962C8B-B14F-4D97-AF65-F5344CB8AC3E}">
-        <p14:creationId xmlns:p14="http://schemas.microsoft.com/office/powerpoint/2010/main" val="3858842334"/>
+        <p14:creationId xmlns:p14="http://schemas.microsoft.com/office/powerpoint/2010/main" xmlns="" val="3858842334"/>
       </p:ext>
     </p:extLst>
   </p:cSld>
@@ -20275,7 +20644,7 @@
   <p:timing>
     <p:tnLst>
       <p:par>
-        <p:cTn xmlns:p14="http://schemas.microsoft.com/office/powerpoint/2010/main" id="1" dur="indefinite" restart="never" nodeType="tmRoot"/>
+        <p:cTn id="1" dur="indefinite" restart="never" nodeType="tmRoot"/>
       </p:par>
     </p:tnLst>
   </p:timing>
@@ -20460,6 +20829,753 @@
                   </a:outerShdw>
                 </a:effectLst>
               </a:rPr>
+              <a:t>Roadmap</a:t>
+            </a:r>
+            <a:endParaRPr lang="en-IN" sz="3600" dirty="0">
+              <a:solidFill>
+                <a:schemeClr val="tx2">
+                  <a:lumMod val="60000"/>
+                  <a:lumOff val="40000"/>
+                </a:schemeClr>
+              </a:solidFill>
+              <a:effectLst>
+                <a:outerShdw blurRad="38100" dist="38100" dir="2700000" algn="tl">
+                  <a:srgbClr val="000000">
+                    <a:alpha val="43137"/>
+                  </a:srgbClr>
+                </a:outerShdw>
+              </a:effectLst>
+            </a:endParaRPr>
+          </a:p>
+        </p:txBody>
+      </p:sp>
+      <p:sp>
+        <p:nvSpPr>
+          <p:cNvPr id="6" name="Slide Number Placeholder 5"/>
+          <p:cNvSpPr>
+            <a:spLocks noGrp="1"/>
+          </p:cNvSpPr>
+          <p:nvPr>
+            <p:ph type="sldNum" sz="quarter" idx="12"/>
+          </p:nvPr>
+        </p:nvSpPr>
+        <p:spPr/>
+        <p:txBody>
+          <a:bodyPr/>
+          <a:lstStyle/>
+          <a:p>
+            <a:fld id="{B6F15528-21DE-4FAA-801E-634DDDAF4B2B}" type="slidenum">
+              <a:rPr lang="en-US" smtClean="0"/>
+              <a:pPr/>
+              <a:t>26</a:t>
+            </a:fld>
+            <a:endParaRPr lang="en-US"/>
+          </a:p>
+        </p:txBody>
+      </p:sp>
+      <p:sp>
+        <p:nvSpPr>
+          <p:cNvPr id="7" name="Footer Placeholder 6"/>
+          <p:cNvSpPr>
+            <a:spLocks noGrp="1"/>
+          </p:cNvSpPr>
+          <p:nvPr>
+            <p:ph type="ftr" sz="quarter" idx="11"/>
+          </p:nvPr>
+        </p:nvSpPr>
+        <p:spPr/>
+        <p:txBody>
+          <a:bodyPr/>
+          <a:lstStyle/>
+          <a:p>
+            <a:r>
+              <a:rPr lang="en-US" smtClean="0"/>
+              <a:t>An STL Pvt Ltd Initiative</a:t>
+            </a:r>
+            <a:endParaRPr lang="en-US"/>
+          </a:p>
+        </p:txBody>
+      </p:sp>
+      <p:pic>
+        <p:nvPicPr>
+          <p:cNvPr id="8" name="Picture 7" descr="stl_logo.gif"/>
+          <p:cNvPicPr>
+            <a:picLocks noChangeAspect="1"/>
+          </p:cNvPicPr>
+          <p:nvPr/>
+        </p:nvPicPr>
+        <p:blipFill>
+          <a:blip r:embed="rId3" cstate="print"/>
+          <a:stretch>
+            <a:fillRect/>
+          </a:stretch>
+        </p:blipFill>
+        <p:spPr>
+          <a:xfrm>
+            <a:off x="228600" y="6096000"/>
+            <a:ext cx="1352550" cy="590550"/>
+          </a:xfrm>
+          <a:prstGeom prst="rect">
+            <a:avLst/>
+          </a:prstGeom>
+        </p:spPr>
+      </p:pic>
+      <p:graphicFrame>
+        <p:nvGraphicFramePr>
+          <p:cNvPr id="4" name="Table 3"/>
+          <p:cNvGraphicFramePr>
+            <a:graphicFrameLocks noGrp="1"/>
+          </p:cNvGraphicFramePr>
+          <p:nvPr>
+            <p:extLst>
+              <p:ext uri="{D42A27DB-BD31-4B8C-83A1-F6EECF244321}">
+                <p14:modId xmlns:p14="http://schemas.microsoft.com/office/powerpoint/2010/main" xmlns="" val="588603736"/>
+              </p:ext>
+            </p:extLst>
+          </p:nvPr>
+        </p:nvGraphicFramePr>
+        <p:xfrm>
+          <a:off x="762000" y="1397000"/>
+          <a:ext cx="7543800" cy="2397760"/>
+        </p:xfrm>
+        <a:graphic>
+          <a:graphicData uri="http://schemas.openxmlformats.org/drawingml/2006/table">
+            <a:tbl>
+              <a:tblPr firstRow="1" bandRow="1">
+                <a:tableStyleId>{8FD4443E-F989-4FC4-A0C8-D5A2AF1F390B}</a:tableStyleId>
+              </a:tblPr>
+              <a:tblGrid>
+                <a:gridCol w="1885950"/>
+                <a:gridCol w="1885950"/>
+                <a:gridCol w="1885950"/>
+                <a:gridCol w="1885950"/>
+              </a:tblGrid>
+              <a:tr h="370840">
+                <a:tc>
+                  <a:txBody>
+                    <a:bodyPr/>
+                    <a:lstStyle/>
+                    <a:p>
+                      <a:r>
+                        <a:rPr lang="en-US" sz="1200" dirty="0" smtClean="0"/>
+                        <a:t>Feature</a:t>
+                      </a:r>
+                      <a:endParaRPr lang="en-US" sz="1200" dirty="0"/>
+                    </a:p>
+                  </a:txBody>
+                  <a:tcPr/>
+                </a:tc>
+                <a:tc>
+                  <a:txBody>
+                    <a:bodyPr/>
+                    <a:lstStyle/>
+                    <a:p>
+                      <a:r>
+                        <a:rPr lang="en-US" sz="1200" dirty="0" smtClean="0"/>
+                        <a:t>Status</a:t>
+                      </a:r>
+                      <a:endParaRPr lang="en-US" sz="1200" dirty="0"/>
+                    </a:p>
+                  </a:txBody>
+                  <a:tcPr/>
+                </a:tc>
+                <a:tc>
+                  <a:txBody>
+                    <a:bodyPr/>
+                    <a:lstStyle/>
+                    <a:p>
+                      <a:pPr marL="0" marR="0" indent="0" algn="l" defTabSz="914400" rtl="0" eaLnBrk="1" fontAlgn="auto" latinLnBrk="0" hangingPunct="1">
+                        <a:lnSpc>
+                          <a:spcPct val="100000"/>
+                        </a:lnSpc>
+                        <a:spcBef>
+                          <a:spcPts val="0"/>
+                        </a:spcBef>
+                        <a:spcAft>
+                          <a:spcPts val="0"/>
+                        </a:spcAft>
+                        <a:buClrTx/>
+                        <a:buSzTx/>
+                        <a:buFontTx/>
+                        <a:buNone/>
+                        <a:tabLst/>
+                        <a:defRPr/>
+                      </a:pPr>
+                      <a:r>
+                        <a:rPr lang="en-US" sz="1200" dirty="0" smtClean="0"/>
+                        <a:t>Release Date</a:t>
+                      </a:r>
+                      <a:endParaRPr lang="en-US" sz="1200" dirty="0"/>
+                    </a:p>
+                  </a:txBody>
+                  <a:tcPr/>
+                </a:tc>
+                <a:tc>
+                  <a:txBody>
+                    <a:bodyPr/>
+                    <a:lstStyle/>
+                    <a:p>
+                      <a:r>
+                        <a:rPr lang="en-US" sz="1200" dirty="0" smtClean="0"/>
+                        <a:t>Remarks</a:t>
+                      </a:r>
+                      <a:endParaRPr lang="en-US" sz="1200" dirty="0"/>
+                    </a:p>
+                  </a:txBody>
+                  <a:tcPr/>
+                </a:tc>
+              </a:tr>
+              <a:tr h="370840">
+                <a:tc>
+                  <a:txBody>
+                    <a:bodyPr/>
+                    <a:lstStyle/>
+                    <a:p>
+                      <a:r>
+                        <a:rPr lang="en-US" sz="1200" dirty="0" smtClean="0"/>
+                        <a:t>HBAS</a:t>
+                      </a:r>
+                      <a:r>
+                        <a:rPr lang="en-US" sz="1200" baseline="0" dirty="0" smtClean="0"/>
+                        <a:t>E Support</a:t>
+                      </a:r>
+                      <a:endParaRPr lang="en-US" sz="1200" dirty="0"/>
+                    </a:p>
+                  </a:txBody>
+                  <a:tcPr/>
+                </a:tc>
+                <a:tc>
+                  <a:txBody>
+                    <a:bodyPr/>
+                    <a:lstStyle/>
+                    <a:p>
+                      <a:r>
+                        <a:rPr lang="en-US" sz="1200" dirty="0" smtClean="0"/>
+                        <a:t>In Progress</a:t>
+                      </a:r>
+                      <a:endParaRPr lang="en-US" sz="1200" dirty="0"/>
+                    </a:p>
+                  </a:txBody>
+                  <a:tcPr/>
+                </a:tc>
+                <a:tc>
+                  <a:txBody>
+                    <a:bodyPr/>
+                    <a:lstStyle/>
+                    <a:p>
+                      <a:r>
+                        <a:rPr lang="en-US" sz="1200" dirty="0" smtClean="0"/>
+                        <a:t>30</a:t>
+                      </a:r>
+                      <a:r>
+                        <a:rPr lang="en-US" sz="1200" baseline="30000" dirty="0" smtClean="0"/>
+                        <a:t>th</a:t>
+                      </a:r>
+                      <a:r>
+                        <a:rPr lang="en-US" sz="1200" dirty="0" smtClean="0"/>
+                        <a:t> April</a:t>
+                      </a:r>
+                      <a:endParaRPr lang="en-US" sz="1200" dirty="0"/>
+                    </a:p>
+                  </a:txBody>
+                  <a:tcPr/>
+                </a:tc>
+                <a:tc>
+                  <a:txBody>
+                    <a:bodyPr/>
+                    <a:lstStyle/>
+                    <a:p>
+                      <a:endParaRPr lang="en-US" sz="1200" dirty="0"/>
+                    </a:p>
+                  </a:txBody>
+                  <a:tcPr/>
+                </a:tc>
+              </a:tr>
+              <a:tr h="370840">
+                <a:tc>
+                  <a:txBody>
+                    <a:bodyPr/>
+                    <a:lstStyle/>
+                    <a:p>
+                      <a:r>
+                        <a:rPr lang="en-US" sz="1200" dirty="0" smtClean="0"/>
+                        <a:t>MongoDB Support</a:t>
+                      </a:r>
+                      <a:endParaRPr lang="en-US" sz="1200" dirty="0"/>
+                    </a:p>
+                  </a:txBody>
+                  <a:tcPr/>
+                </a:tc>
+                <a:tc>
+                  <a:txBody>
+                    <a:bodyPr/>
+                    <a:lstStyle/>
+                    <a:p>
+                      <a:r>
+                        <a:rPr lang="en-US" sz="1200" dirty="0" smtClean="0"/>
+                        <a:t>Planned</a:t>
+                      </a:r>
+                      <a:endParaRPr lang="en-US" sz="1200" dirty="0"/>
+                    </a:p>
+                  </a:txBody>
+                  <a:tcPr/>
+                </a:tc>
+                <a:tc>
+                  <a:txBody>
+                    <a:bodyPr/>
+                    <a:lstStyle/>
+                    <a:p>
+                      <a:r>
+                        <a:rPr lang="en-US" sz="1200" dirty="0" smtClean="0"/>
+                        <a:t>30</a:t>
+                      </a:r>
+                      <a:r>
+                        <a:rPr lang="en-US" sz="1200" baseline="30000" dirty="0" smtClean="0"/>
+                        <a:t>th</a:t>
+                      </a:r>
+                      <a:r>
+                        <a:rPr lang="en-US" sz="1200" dirty="0" smtClean="0"/>
+                        <a:t> June</a:t>
+                      </a:r>
+                      <a:endParaRPr lang="en-US" sz="1200" dirty="0"/>
+                    </a:p>
+                  </a:txBody>
+                  <a:tcPr/>
+                </a:tc>
+                <a:tc>
+                  <a:txBody>
+                    <a:bodyPr/>
+                    <a:lstStyle/>
+                    <a:p>
+                      <a:endParaRPr lang="en-US" sz="1200" dirty="0"/>
+                    </a:p>
+                  </a:txBody>
+                  <a:tcPr/>
+                </a:tc>
+              </a:tr>
+              <a:tr h="370840">
+                <a:tc>
+                  <a:txBody>
+                    <a:bodyPr/>
+                    <a:lstStyle/>
+                    <a:p>
+                      <a:r>
+                        <a:rPr lang="en-US" sz="1200" dirty="0" err="1" smtClean="0"/>
+                        <a:t>Hadoop</a:t>
+                      </a:r>
+                      <a:r>
+                        <a:rPr lang="en-US" sz="1200" baseline="0" dirty="0" smtClean="0"/>
+                        <a:t> </a:t>
+                      </a:r>
+                      <a:r>
+                        <a:rPr lang="en-US" sz="1200" baseline="0" dirty="0" err="1" smtClean="0"/>
+                        <a:t>MapReduce</a:t>
+                      </a:r>
+                      <a:r>
+                        <a:rPr lang="en-US" sz="1200" baseline="0" dirty="0" smtClean="0"/>
+                        <a:t> Integration</a:t>
+                      </a:r>
+                      <a:endParaRPr lang="en-US" sz="1200" dirty="0"/>
+                    </a:p>
+                  </a:txBody>
+                  <a:tcPr/>
+                </a:tc>
+                <a:tc>
+                  <a:txBody>
+                    <a:bodyPr/>
+                    <a:lstStyle/>
+                    <a:p>
+                      <a:r>
+                        <a:rPr lang="en-US" sz="1200" dirty="0" smtClean="0"/>
+                        <a:t>Planned</a:t>
+                      </a:r>
+                      <a:endParaRPr lang="en-US" sz="1200" dirty="0"/>
+                    </a:p>
+                  </a:txBody>
+                  <a:tcPr/>
+                </a:tc>
+                <a:tc>
+                  <a:txBody>
+                    <a:bodyPr/>
+                    <a:lstStyle/>
+                    <a:p>
+                      <a:pPr marL="0" marR="0" indent="0" algn="l" defTabSz="914400" rtl="0" eaLnBrk="1" fontAlgn="auto" latinLnBrk="0" hangingPunct="1">
+                        <a:lnSpc>
+                          <a:spcPct val="100000"/>
+                        </a:lnSpc>
+                        <a:spcBef>
+                          <a:spcPts val="0"/>
+                        </a:spcBef>
+                        <a:spcAft>
+                          <a:spcPts val="0"/>
+                        </a:spcAft>
+                        <a:buClrTx/>
+                        <a:buSzTx/>
+                        <a:buFontTx/>
+                        <a:buNone/>
+                        <a:tabLst/>
+                        <a:defRPr/>
+                      </a:pPr>
+                      <a:r>
+                        <a:rPr lang="en-US" sz="1200" dirty="0" smtClean="0"/>
+                        <a:t>30</a:t>
+                      </a:r>
+                      <a:r>
+                        <a:rPr lang="en-US" sz="1200" baseline="30000" dirty="0" smtClean="0"/>
+                        <a:t>th</a:t>
+                      </a:r>
+                      <a:r>
+                        <a:rPr lang="en-US" sz="1200" dirty="0" smtClean="0"/>
+                        <a:t> June</a:t>
+                      </a:r>
+                    </a:p>
+                    <a:p>
+                      <a:endParaRPr lang="en-US" sz="1200" dirty="0"/>
+                    </a:p>
+                  </a:txBody>
+                  <a:tcPr/>
+                </a:tc>
+                <a:tc>
+                  <a:txBody>
+                    <a:bodyPr/>
+                    <a:lstStyle/>
+                    <a:p>
+                      <a:endParaRPr lang="en-US" sz="1200" dirty="0"/>
+                    </a:p>
+                  </a:txBody>
+                  <a:tcPr/>
+                </a:tc>
+              </a:tr>
+              <a:tr h="370840">
+                <a:tc>
+                  <a:txBody>
+                    <a:bodyPr/>
+                    <a:lstStyle/>
+                    <a:p>
+                      <a:r>
+                        <a:rPr lang="en-US" sz="1200" dirty="0" smtClean="0"/>
+                        <a:t>Twitter</a:t>
+                      </a:r>
+                      <a:r>
+                        <a:rPr lang="en-US" sz="1200" baseline="0" dirty="0" smtClean="0"/>
+                        <a:t> Analytics</a:t>
+                      </a:r>
+                      <a:endParaRPr lang="en-US" sz="1200" dirty="0"/>
+                    </a:p>
+                  </a:txBody>
+                  <a:tcPr/>
+                </a:tc>
+                <a:tc>
+                  <a:txBody>
+                    <a:bodyPr/>
+                    <a:lstStyle/>
+                    <a:p>
+                      <a:r>
+                        <a:rPr lang="en-US" sz="1200" dirty="0" smtClean="0"/>
+                        <a:t>Planned</a:t>
+                      </a:r>
+                      <a:endParaRPr lang="en-US" sz="1200" dirty="0"/>
+                    </a:p>
+                  </a:txBody>
+                  <a:tcPr/>
+                </a:tc>
+                <a:tc>
+                  <a:txBody>
+                    <a:bodyPr/>
+                    <a:lstStyle/>
+                    <a:p>
+                      <a:r>
+                        <a:rPr lang="en-US" sz="1200" dirty="0" smtClean="0"/>
+                        <a:t>30</a:t>
+                      </a:r>
+                      <a:r>
+                        <a:rPr lang="en-US" sz="1200" baseline="30000" dirty="0" smtClean="0"/>
+                        <a:t>th</a:t>
+                      </a:r>
+                      <a:r>
+                        <a:rPr lang="en-US" sz="1200" dirty="0" smtClean="0"/>
+                        <a:t> June</a:t>
+                      </a:r>
+                      <a:endParaRPr lang="en-US" sz="1200" dirty="0"/>
+                    </a:p>
+                  </a:txBody>
+                  <a:tcPr/>
+                </a:tc>
+                <a:tc>
+                  <a:txBody>
+                    <a:bodyPr/>
+                    <a:lstStyle/>
+                    <a:p>
+                      <a:endParaRPr lang="en-US" sz="1200" dirty="0"/>
+                    </a:p>
+                  </a:txBody>
+                  <a:tcPr/>
+                </a:tc>
+              </a:tr>
+              <a:tr h="370840">
+                <a:tc>
+                  <a:txBody>
+                    <a:bodyPr/>
+                    <a:lstStyle/>
+                    <a:p>
+                      <a:r>
+                        <a:rPr lang="en-US" sz="1200" dirty="0" smtClean="0"/>
+                        <a:t>Support for Custom Web Feeds</a:t>
+                      </a:r>
+                      <a:endParaRPr lang="en-US" sz="1200" dirty="0"/>
+                    </a:p>
+                  </a:txBody>
+                  <a:tcPr/>
+                </a:tc>
+                <a:tc>
+                  <a:txBody>
+                    <a:bodyPr/>
+                    <a:lstStyle/>
+                    <a:p>
+                      <a:r>
+                        <a:rPr lang="en-US" sz="1200" dirty="0" smtClean="0"/>
+                        <a:t>Planned</a:t>
+                      </a:r>
+                      <a:endParaRPr lang="en-US" sz="1200" dirty="0"/>
+                    </a:p>
+                  </a:txBody>
+                  <a:tcPr/>
+                </a:tc>
+                <a:tc>
+                  <a:txBody>
+                    <a:bodyPr/>
+                    <a:lstStyle/>
+                    <a:p>
+                      <a:r>
+                        <a:rPr lang="en-US" sz="1200" dirty="0" smtClean="0"/>
+                        <a:t>30</a:t>
+                      </a:r>
+                      <a:r>
+                        <a:rPr lang="en-US" sz="1200" baseline="30000" dirty="0" smtClean="0"/>
+                        <a:t>th</a:t>
+                      </a:r>
+                      <a:r>
+                        <a:rPr lang="en-US" sz="1200" dirty="0" smtClean="0"/>
+                        <a:t> June</a:t>
+                      </a:r>
+                      <a:endParaRPr lang="en-US" sz="1200" dirty="0"/>
+                    </a:p>
+                  </a:txBody>
+                  <a:tcPr/>
+                </a:tc>
+                <a:tc>
+                  <a:txBody>
+                    <a:bodyPr/>
+                    <a:lstStyle/>
+                    <a:p>
+                      <a:endParaRPr lang="en-US" sz="1200" dirty="0"/>
+                    </a:p>
+                  </a:txBody>
+                  <a:tcPr/>
+                </a:tc>
+              </a:tr>
+            </a:tbl>
+          </a:graphicData>
+        </a:graphic>
+      </p:graphicFrame>
+    </p:spTree>
+    <p:extLst>
+      <p:ext uri="{BB962C8B-B14F-4D97-AF65-F5344CB8AC3E}">
+        <p14:creationId xmlns:p14="http://schemas.microsoft.com/office/powerpoint/2010/main" xmlns="" val="3858842334"/>
+      </p:ext>
+    </p:extLst>
+  </p:cSld>
+  <p:clrMapOvr>
+    <a:masterClrMapping/>
+  </p:clrMapOvr>
+  <p:timing>
+    <p:tnLst>
+      <p:par>
+        <p:cTn id="1" dur="indefinite" restart="never" nodeType="tmRoot"/>
+      </p:par>
+    </p:tnLst>
+  </p:timing>
+</p:sld>
+</file>
+
+<file path=ppt/slides/slide27.xml><?xml version="1.0" encoding="utf-8"?>
+<p:sld xmlns:a="http://schemas.openxmlformats.org/drawingml/2006/main" xmlns:r="http://schemas.openxmlformats.org/officeDocument/2006/relationships" xmlns:p="http://schemas.openxmlformats.org/presentationml/2006/main">
+  <p:cSld>
+    <p:spTree>
+      <p:nvGrpSpPr>
+        <p:cNvPr id="1" name=""/>
+        <p:cNvGrpSpPr/>
+        <p:nvPr/>
+      </p:nvGrpSpPr>
+      <p:grpSpPr>
+        <a:xfrm>
+          <a:off x="0" y="0"/>
+          <a:ext cx="0" cy="0"/>
+          <a:chOff x="0" y="0"/>
+          <a:chExt cx="0" cy="0"/>
+        </a:xfrm>
+      </p:grpSpPr>
+      <p:sp>
+        <p:nvSpPr>
+          <p:cNvPr id="11" name="Rectangle 10"/>
+          <p:cNvSpPr/>
+          <p:nvPr/>
+        </p:nvSpPr>
+        <p:spPr>
+          <a:xfrm>
+            <a:off x="0" y="0"/>
+            <a:ext cx="9144000" cy="228600"/>
+          </a:xfrm>
+          <a:prstGeom prst="rect">
+            <a:avLst/>
+          </a:prstGeom>
+          <a:solidFill>
+            <a:schemeClr val="tx2">
+              <a:lumMod val="60000"/>
+              <a:lumOff val="40000"/>
+            </a:schemeClr>
+          </a:solidFill>
+          <a:ln>
+            <a:noFill/>
+          </a:ln>
+        </p:spPr>
+        <p:style>
+          <a:lnRef idx="2">
+            <a:schemeClr val="accent1">
+              <a:shade val="50000"/>
+            </a:schemeClr>
+          </a:lnRef>
+          <a:fillRef idx="1">
+            <a:schemeClr val="accent1"/>
+          </a:fillRef>
+          <a:effectRef idx="0">
+            <a:schemeClr val="accent1"/>
+          </a:effectRef>
+          <a:fontRef idx="minor">
+            <a:schemeClr val="lt1"/>
+          </a:fontRef>
+        </p:style>
+        <p:txBody>
+          <a:bodyPr rtlCol="0" anchor="ctr"/>
+          <a:lstStyle/>
+          <a:p>
+            <a:pPr algn="r"/>
+            <a:endParaRPr lang="en-IN" sz="1400" dirty="0">
+              <a:solidFill>
+                <a:schemeClr val="bg1">
+                  <a:lumMod val="75000"/>
+                </a:schemeClr>
+              </a:solidFill>
+            </a:endParaRPr>
+          </a:p>
+        </p:txBody>
+      </p:sp>
+      <p:sp>
+        <p:nvSpPr>
+          <p:cNvPr id="18" name="Rectangle 17"/>
+          <p:cNvSpPr/>
+          <p:nvPr/>
+        </p:nvSpPr>
+        <p:spPr>
+          <a:xfrm>
+            <a:off x="0" y="228600"/>
+            <a:ext cx="9144000" cy="609600"/>
+          </a:xfrm>
+          <a:prstGeom prst="rect">
+            <a:avLst/>
+          </a:prstGeom>
+          <a:solidFill>
+            <a:schemeClr val="bg1">
+              <a:lumMod val="95000"/>
+            </a:schemeClr>
+          </a:solidFill>
+          <a:ln>
+            <a:noFill/>
+          </a:ln>
+        </p:spPr>
+        <p:style>
+          <a:lnRef idx="2">
+            <a:schemeClr val="accent1">
+              <a:shade val="50000"/>
+            </a:schemeClr>
+          </a:lnRef>
+          <a:fillRef idx="1">
+            <a:schemeClr val="accent1"/>
+          </a:fillRef>
+          <a:effectRef idx="0">
+            <a:schemeClr val="accent1"/>
+          </a:effectRef>
+          <a:fontRef idx="minor">
+            <a:schemeClr val="lt1"/>
+          </a:fontRef>
+        </p:style>
+        <p:txBody>
+          <a:bodyPr rtlCol="0" anchor="ctr"/>
+          <a:lstStyle/>
+          <a:p>
+            <a:pPr algn="ctr"/>
+            <a:endParaRPr lang="en-IN" sz="1400" dirty="0"/>
+          </a:p>
+        </p:txBody>
+      </p:sp>
+      <p:sp>
+        <p:nvSpPr>
+          <p:cNvPr id="19" name="Rectangle 18"/>
+          <p:cNvSpPr/>
+          <p:nvPr/>
+        </p:nvSpPr>
+        <p:spPr>
+          <a:xfrm>
+            <a:off x="0" y="228601"/>
+            <a:ext cx="9144000" cy="457199"/>
+          </a:xfrm>
+          <a:prstGeom prst="rect">
+            <a:avLst/>
+          </a:prstGeom>
+          <a:solidFill>
+            <a:schemeClr val="bg1">
+              <a:lumMod val="95000"/>
+            </a:schemeClr>
+          </a:solidFill>
+          <a:ln>
+            <a:noFill/>
+          </a:ln>
+        </p:spPr>
+        <p:style>
+          <a:lnRef idx="2">
+            <a:schemeClr val="accent1">
+              <a:shade val="50000"/>
+            </a:schemeClr>
+          </a:lnRef>
+          <a:fillRef idx="1">
+            <a:schemeClr val="accent1"/>
+          </a:fillRef>
+          <a:effectRef idx="0">
+            <a:schemeClr val="accent1"/>
+          </a:effectRef>
+          <a:fontRef idx="minor">
+            <a:schemeClr val="lt1"/>
+          </a:fontRef>
+        </p:style>
+        <p:txBody>
+          <a:bodyPr rtlCol="0" anchor="ctr"/>
+          <a:lstStyle/>
+          <a:p>
+            <a:r>
+              <a:rPr lang="en-US" sz="3600" dirty="0" smtClean="0">
+                <a:solidFill>
+                  <a:schemeClr val="bg1">
+                    <a:lumMod val="75000"/>
+                  </a:schemeClr>
+                </a:solidFill>
+                <a:effectLst>
+                  <a:outerShdw blurRad="38100" dist="38100" dir="2700000" algn="tl">
+                    <a:srgbClr val="000000">
+                      <a:alpha val="43137"/>
+                    </a:srgbClr>
+                  </a:outerShdw>
+                </a:effectLst>
+              </a:rPr>
               <a:t>Thank You</a:t>
             </a:r>
             <a:endParaRPr lang="en-IN" sz="3600" dirty="0">
@@ -20498,7 +21614,7 @@
             <a:fld id="{B6F15528-21DE-4FAA-801E-634DDDAF4B2B}" type="slidenum">
               <a:rPr lang="en-US" smtClean="0"/>
               <a:pPr/>
-              <a:t>26</a:t>
+              <a:t>27</a:t>
             </a:fld>
             <a:endParaRPr lang="en-US"/>
           </a:p>
@@ -20554,7 +21670,7 @@
     </p:spTree>
     <p:extLst>
       <p:ext uri="{BB962C8B-B14F-4D97-AF65-F5344CB8AC3E}">
-        <p14:creationId xmlns:p14="http://schemas.microsoft.com/office/powerpoint/2010/main" val="3919418935"/>
+        <p14:creationId xmlns:p14="http://schemas.microsoft.com/office/powerpoint/2010/main" xmlns="" val="3919418935"/>
       </p:ext>
     </p:extLst>
   </p:cSld>
@@ -20564,7 +21680,7 @@
   <p:timing>
     <p:tnLst>
       <p:par>
-        <p:cTn xmlns:p14="http://schemas.microsoft.com/office/powerpoint/2010/main" id="1" dur="indefinite" restart="never" nodeType="tmRoot"/>
+        <p:cTn id="1" dur="indefinite" restart="never" nodeType="tmRoot"/>
       </p:par>
     </p:tnLst>
   </p:timing>
@@ -21033,10 +22149,34 @@
           </a:p>
         </p:txBody>
       </p:sp>
+      <p:pic>
+        <p:nvPicPr>
+          <p:cNvPr id="12" name="Picture 11" descr="stl_logo.gif"/>
+          <p:cNvPicPr>
+            <a:picLocks noChangeAspect="1"/>
+          </p:cNvPicPr>
+          <p:nvPr/>
+        </p:nvPicPr>
+        <p:blipFill>
+          <a:blip r:embed="rId2" cstate="print"/>
+          <a:stretch>
+            <a:fillRect/>
+          </a:stretch>
+        </p:blipFill>
+        <p:spPr>
+          <a:xfrm>
+            <a:off x="228600" y="6096000"/>
+            <a:ext cx="1352550" cy="590550"/>
+          </a:xfrm>
+          <a:prstGeom prst="rect">
+            <a:avLst/>
+          </a:prstGeom>
+        </p:spPr>
+      </p:pic>
     </p:spTree>
     <p:extLst>
       <p:ext uri="{BB962C8B-B14F-4D97-AF65-F5344CB8AC3E}">
-        <p14:creationId xmlns:p14="http://schemas.microsoft.com/office/powerpoint/2010/main" val="911566382"/>
+        <p14:creationId xmlns:p14="http://schemas.microsoft.com/office/powerpoint/2010/main" xmlns="" val="911566382"/>
       </p:ext>
     </p:extLst>
   </p:cSld>
@@ -21046,7 +22186,7 @@
   <p:timing>
     <p:tnLst>
       <p:par>
-        <p:cTn xmlns:p14="http://schemas.microsoft.com/office/powerpoint/2010/main" id="1" dur="indefinite" restart="never" nodeType="tmRoot"/>
+        <p:cTn id="1" dur="indefinite" restart="never" nodeType="tmRoot"/>
       </p:par>
     </p:tnLst>
   </p:timing>
@@ -21326,7 +22466,7 @@
     </p:spTree>
     <p:extLst>
       <p:ext uri="{BB962C8B-B14F-4D97-AF65-F5344CB8AC3E}">
-        <p14:creationId xmlns:p14="http://schemas.microsoft.com/office/powerpoint/2010/main" val="2918675523"/>
+        <p14:creationId xmlns:p14="http://schemas.microsoft.com/office/powerpoint/2010/main" xmlns="" val="2918675523"/>
       </p:ext>
     </p:extLst>
   </p:cSld>
@@ -21336,7 +22476,7 @@
   <p:timing>
     <p:tnLst>
       <p:par>
-        <p:cTn xmlns:p14="http://schemas.microsoft.com/office/powerpoint/2010/main" id="1" dur="indefinite" restart="never" nodeType="tmRoot"/>
+        <p:cTn id="1" dur="indefinite" restart="never" nodeType="tmRoot"/>
       </p:par>
     </p:tnLst>
   </p:timing>
@@ -21647,10 +22787,34 @@
           </a:p>
         </p:txBody>
       </p:sp>
+      <p:pic>
+        <p:nvPicPr>
+          <p:cNvPr id="7" name="Picture 6" descr="stl_logo.gif"/>
+          <p:cNvPicPr>
+            <a:picLocks noChangeAspect="1"/>
+          </p:cNvPicPr>
+          <p:nvPr/>
+        </p:nvPicPr>
+        <p:blipFill>
+          <a:blip r:embed="rId3" cstate="print"/>
+          <a:stretch>
+            <a:fillRect/>
+          </a:stretch>
+        </p:blipFill>
+        <p:spPr>
+          <a:xfrm>
+            <a:off x="228600" y="6096000"/>
+            <a:ext cx="1352550" cy="590550"/>
+          </a:xfrm>
+          <a:prstGeom prst="rect">
+            <a:avLst/>
+          </a:prstGeom>
+        </p:spPr>
+      </p:pic>
     </p:spTree>
     <p:extLst>
       <p:ext uri="{BB962C8B-B14F-4D97-AF65-F5344CB8AC3E}">
-        <p14:creationId xmlns:p14="http://schemas.microsoft.com/office/powerpoint/2010/main" val="911566382"/>
+        <p14:creationId xmlns:p14="http://schemas.microsoft.com/office/powerpoint/2010/main" xmlns="" val="911566382"/>
       </p:ext>
     </p:extLst>
   </p:cSld>
@@ -21660,7 +22824,7 @@
   <p:timing>
     <p:tnLst>
       <p:par>
-        <p:cTn xmlns:p14="http://schemas.microsoft.com/office/powerpoint/2010/main" id="1" dur="indefinite" restart="never" nodeType="tmRoot"/>
+        <p:cTn id="1" dur="indefinite" restart="never" nodeType="tmRoot"/>
       </p:par>
     </p:tnLst>
   </p:timing>
@@ -22028,10 +23192,34 @@
           </a:p>
         </p:txBody>
       </p:sp>
+      <p:pic>
+        <p:nvPicPr>
+          <p:cNvPr id="9" name="Picture 8" descr="stl_logo.gif"/>
+          <p:cNvPicPr>
+            <a:picLocks noChangeAspect="1"/>
+          </p:cNvPicPr>
+          <p:nvPr/>
+        </p:nvPicPr>
+        <p:blipFill>
+          <a:blip r:embed="rId3" cstate="print"/>
+          <a:stretch>
+            <a:fillRect/>
+          </a:stretch>
+        </p:blipFill>
+        <p:spPr>
+          <a:xfrm>
+            <a:off x="228600" y="6096000"/>
+            <a:ext cx="1352550" cy="590550"/>
+          </a:xfrm>
+          <a:prstGeom prst="rect">
+            <a:avLst/>
+          </a:prstGeom>
+        </p:spPr>
+      </p:pic>
     </p:spTree>
     <p:extLst>
       <p:ext uri="{BB962C8B-B14F-4D97-AF65-F5344CB8AC3E}">
-        <p14:creationId xmlns:p14="http://schemas.microsoft.com/office/powerpoint/2010/main" val="911566382"/>
+        <p14:creationId xmlns:p14="http://schemas.microsoft.com/office/powerpoint/2010/main" xmlns="" val="911566382"/>
       </p:ext>
     </p:extLst>
   </p:cSld>
@@ -22041,7 +23229,7 @@
   <p:timing>
     <p:tnLst>
       <p:par>
-        <p:cTn xmlns:p14="http://schemas.microsoft.com/office/powerpoint/2010/main" id="1" dur="indefinite" restart="never" nodeType="tmRoot"/>
+        <p:cTn id="1" dur="indefinite" restart="never" nodeType="tmRoot"/>
       </p:par>
     </p:tnLst>
   </p:timing>
@@ -22352,10 +23540,34 @@
           </a:p>
         </p:txBody>
       </p:sp>
+      <p:pic>
+        <p:nvPicPr>
+          <p:cNvPr id="7" name="Picture 6" descr="stl_logo.gif"/>
+          <p:cNvPicPr>
+            <a:picLocks noChangeAspect="1"/>
+          </p:cNvPicPr>
+          <p:nvPr/>
+        </p:nvPicPr>
+        <p:blipFill>
+          <a:blip r:embed="rId3" cstate="print"/>
+          <a:stretch>
+            <a:fillRect/>
+          </a:stretch>
+        </p:blipFill>
+        <p:spPr>
+          <a:xfrm>
+            <a:off x="228600" y="6096000"/>
+            <a:ext cx="1352550" cy="590550"/>
+          </a:xfrm>
+          <a:prstGeom prst="rect">
+            <a:avLst/>
+          </a:prstGeom>
+        </p:spPr>
+      </p:pic>
     </p:spTree>
     <p:extLst>
       <p:ext uri="{BB962C8B-B14F-4D97-AF65-F5344CB8AC3E}">
-        <p14:creationId xmlns:p14="http://schemas.microsoft.com/office/powerpoint/2010/main" val="911566382"/>
+        <p14:creationId xmlns:p14="http://schemas.microsoft.com/office/powerpoint/2010/main" xmlns="" val="911566382"/>
       </p:ext>
     </p:extLst>
   </p:cSld>
@@ -22365,7 +23577,7 @@
   <p:timing>
     <p:tnLst>
       <p:par>
-        <p:cTn xmlns:p14="http://schemas.microsoft.com/office/powerpoint/2010/main" id="1" dur="indefinite" restart="never" nodeType="tmRoot"/>
+        <p:cTn id="1" dur="indefinite" restart="never" nodeType="tmRoot"/>
       </p:par>
     </p:tnLst>
   </p:timing>
@@ -22676,10 +23888,34 @@
           </a:p>
         </p:txBody>
       </p:sp>
+      <p:pic>
+        <p:nvPicPr>
+          <p:cNvPr id="7" name="Picture 6" descr="stl_logo.gif"/>
+          <p:cNvPicPr>
+            <a:picLocks noChangeAspect="1"/>
+          </p:cNvPicPr>
+          <p:nvPr/>
+        </p:nvPicPr>
+        <p:blipFill>
+          <a:blip r:embed="rId3" cstate="print"/>
+          <a:stretch>
+            <a:fillRect/>
+          </a:stretch>
+        </p:blipFill>
+        <p:spPr>
+          <a:xfrm>
+            <a:off x="228600" y="6096000"/>
+            <a:ext cx="1352550" cy="590550"/>
+          </a:xfrm>
+          <a:prstGeom prst="rect">
+            <a:avLst/>
+          </a:prstGeom>
+        </p:spPr>
+      </p:pic>
     </p:spTree>
     <p:extLst>
       <p:ext uri="{BB962C8B-B14F-4D97-AF65-F5344CB8AC3E}">
-        <p14:creationId xmlns:p14="http://schemas.microsoft.com/office/powerpoint/2010/main" val="911566382"/>
+        <p14:creationId xmlns:p14="http://schemas.microsoft.com/office/powerpoint/2010/main" xmlns="" val="911566382"/>
       </p:ext>
     </p:extLst>
   </p:cSld>
@@ -22689,7 +23925,7 @@
   <p:timing>
     <p:tnLst>
       <p:par>
-        <p:cTn xmlns:p14="http://schemas.microsoft.com/office/powerpoint/2010/main" id="1" dur="indefinite" restart="never" nodeType="tmRoot"/>
+        <p:cTn id="1" dur="indefinite" restart="never" nodeType="tmRoot"/>
       </p:par>
     </p:tnLst>
   </p:timing>
@@ -22969,7 +24205,7 @@
     </p:spTree>
     <p:extLst>
       <p:ext uri="{BB962C8B-B14F-4D97-AF65-F5344CB8AC3E}">
-        <p14:creationId xmlns:p14="http://schemas.microsoft.com/office/powerpoint/2010/main" val="3497022092"/>
+        <p14:creationId xmlns:p14="http://schemas.microsoft.com/office/powerpoint/2010/main" xmlns="" val="3497022092"/>
       </p:ext>
     </p:extLst>
   </p:cSld>
@@ -22979,7 +24215,7 @@
   <p:timing>
     <p:tnLst>
       <p:par>
-        <p:cTn xmlns:p14="http://schemas.microsoft.com/office/powerpoint/2010/main" id="1" dur="indefinite" restart="never" nodeType="tmRoot"/>
+        <p:cTn id="1" dur="indefinite" restart="never" nodeType="tmRoot"/>
       </p:par>
     </p:tnLst>
   </p:timing>

</xml_diff>